<commit_message>
Updated summary statistics, 1275 graph
</commit_message>
<xml_diff>
--- a/Sartorious_experiments/Finalised_Data/Sartorious Experiments Summary Statistics.pptx
+++ b/Sartorious_experiments/Finalised_Data/Sartorious Experiments Summary Statistics.pptx
@@ -1107,7 +1107,7 @@
       </p:grpSpPr>
       <p:sp>
         <p:nvSpPr>
-          <p:cNvPr id="76" name="Google Shape;76;g224ff036bbd_0_27:notes"/>
+          <p:cNvPr id="76" name="Google Shape;76;g224ff036bbd_0_17:notes"/>
           <p:cNvSpPr/>
           <p:nvPr>
             <p:ph idx="2" type="sldImg"/>
@@ -1142,7 +1142,7 @@
       </p:sp>
       <p:sp>
         <p:nvSpPr>
-          <p:cNvPr id="77" name="Google Shape;77;g224ff036bbd_0_27:notes"/>
+          <p:cNvPr id="77" name="Google Shape;77;g224ff036bbd_0_17:notes"/>
           <p:cNvSpPr txBox="1"/>
           <p:nvPr>
             <p:ph idx="1" type="body"/>
@@ -1305,7 +1305,7 @@
       </p:grpSpPr>
       <p:sp>
         <p:nvSpPr>
-          <p:cNvPr id="89" name="Google Shape;89;g224ff036bbd_0_17:notes"/>
+          <p:cNvPr id="89" name="Google Shape;89;g224ff036bbd_0_27:notes"/>
           <p:cNvSpPr/>
           <p:nvPr>
             <p:ph idx="2" type="sldImg"/>
@@ -1340,7 +1340,7 @@
       </p:sp>
       <p:sp>
         <p:nvSpPr>
-          <p:cNvPr id="90" name="Google Shape;90;g224ff036bbd_0_17:notes"/>
+          <p:cNvPr id="90" name="Google Shape;90;g224ff036bbd_0_27:notes"/>
           <p:cNvSpPr txBox="1"/>
           <p:nvPr>
             <p:ph idx="1" type="body"/>
@@ -6171,7 +6171,7 @@
             <a:tbl>
               <a:tblPr>
                 <a:noFill/>
-                <a:tableStyleId>{BD923046-00A1-4CA7-9650-ED32B89D57B0}</a:tableStyleId>
+                <a:tableStyleId>{C0094115-561D-4E24-A11C-18F0548FBB05}</a:tableStyleId>
               </a:tblPr>
               <a:tblGrid>
                 <a:gridCol w="1109650"/>
@@ -9846,7 +9846,7 @@
         </p:blipFill>
         <p:spPr>
           <a:xfrm>
-            <a:off x="902424" y="740875"/>
+            <a:off x="1356224" y="624325"/>
             <a:ext cx="6431550" cy="3430176"/>
           </a:xfrm>
           <a:prstGeom prst="rect">
@@ -9873,7 +9873,7 @@
             <a:tbl>
               <a:tblPr>
                 <a:noFill/>
-                <a:tableStyleId>{BD923046-00A1-4CA7-9650-ED32B89D57B0}</a:tableStyleId>
+                <a:tableStyleId>{C0094115-561D-4E24-A11C-18F0548FBB05}</a:tableStyleId>
               </a:tblPr>
               <a:tblGrid>
                 <a:gridCol w="1095375"/>
@@ -11302,7 +11302,7 @@
         </p:blipFill>
         <p:spPr>
           <a:xfrm>
-            <a:off x="1018975" y="740875"/>
+            <a:off x="1473625" y="740875"/>
             <a:ext cx="6196774" cy="3304950"/>
           </a:xfrm>
           <a:prstGeom prst="rect">
@@ -11329,7 +11329,7 @@
             <a:tbl>
               <a:tblPr>
                 <a:noFill/>
-                <a:tableStyleId>{BD923046-00A1-4CA7-9650-ED32B89D57B0}</a:tableStyleId>
+                <a:tableStyleId>{C0094115-561D-4E24-A11C-18F0548FBB05}</a:tableStyleId>
               </a:tblPr>
               <a:tblGrid>
                 <a:gridCol w="1095375"/>
@@ -12712,7 +12712,7 @@
         </p:nvSpPr>
         <p:spPr>
           <a:xfrm>
-            <a:off x="311700" y="445025"/>
+            <a:off x="311700" y="197325"/>
             <a:ext cx="8520600" cy="572700"/>
           </a:xfrm>
           <a:prstGeom prst="rect">
@@ -12862,7 +12862,7 @@
         </p:blipFill>
         <p:spPr>
           <a:xfrm>
-            <a:off x="1185076" y="740875"/>
+            <a:off x="1626576" y="740875"/>
             <a:ext cx="5890849" cy="3141800"/>
           </a:xfrm>
           <a:prstGeom prst="rect">
@@ -12889,7 +12889,7 @@
             <a:tbl>
               <a:tblPr>
                 <a:noFill/>
-                <a:tableStyleId>{BD923046-00A1-4CA7-9650-ED32B89D57B0}</a:tableStyleId>
+                <a:tableStyleId>{C0094115-561D-4E24-A11C-18F0548FBB05}</a:tableStyleId>
               </a:tblPr>
               <a:tblGrid>
                 <a:gridCol w="1095375"/>
@@ -14275,7 +14275,7 @@
         </p:nvSpPr>
         <p:spPr>
           <a:xfrm>
-            <a:off x="311700" y="445025"/>
+            <a:off x="311700" y="139025"/>
             <a:ext cx="8520600" cy="572700"/>
           </a:xfrm>
           <a:prstGeom prst="rect">
@@ -14305,45 +14305,1397 @@
           </a:p>
         </p:txBody>
       </p:sp>
-      <p:sp>
-        <p:nvSpPr>
+      <p:graphicFrame>
+        <p:nvGraphicFramePr>
           <p:cNvPr id="93" name="Google Shape;93;p19"/>
-          <p:cNvSpPr txBox="1"/>
-          <p:nvPr>
-            <p:ph idx="1" type="body"/>
-          </p:nvPr>
-        </p:nvSpPr>
+          <p:cNvGraphicFramePr/>
+          <p:nvPr/>
+        </p:nvGraphicFramePr>
+        <p:xfrm>
+          <a:off x="214313" y="3984525"/>
+          <a:ext cx="3000000" cy="3000000"/>
+        </p:xfrm>
+        <a:graphic>
+          <a:graphicData uri="http://schemas.openxmlformats.org/drawingml/2006/table">
+            <a:tbl>
+              <a:tblPr>
+                <a:noFill/>
+                <a:tableStyleId>{C0094115-561D-4E24-A11C-18F0548FBB05}</a:tableStyleId>
+              </a:tblPr>
+              <a:tblGrid>
+                <a:gridCol w="1095375"/>
+                <a:gridCol w="952500"/>
+                <a:gridCol w="952500"/>
+                <a:gridCol w="952500"/>
+                <a:gridCol w="952500"/>
+                <a:gridCol w="952500"/>
+                <a:gridCol w="952500"/>
+                <a:gridCol w="952500"/>
+                <a:gridCol w="952500"/>
+              </a:tblGrid>
+              <a:tr h="200025">
+                <a:tc>
+                  <a:txBody>
+                    <a:bodyPr/>
+                    <a:lstStyle/>
+                    <a:p>
+                      <a:pPr indent="0" lvl="0" marL="0" rtl="0" algn="l">
+                        <a:spcBef>
+                          <a:spcPts val="0"/>
+                        </a:spcBef>
+                        <a:spcAft>
+                          <a:spcPts val="0"/>
+                        </a:spcAft>
+                        <a:buNone/>
+                      </a:pPr>
+                      <a:r>
+                        <a:t/>
+                      </a:r>
+                      <a:endParaRPr/>
+                    </a:p>
+                  </a:txBody>
+                  <a:tcPr marT="19050" marB="19050" marR="28575" marL="28575" anchor="b">
+                    <a:lnL cap="flat" cmpd="sng" w="6350">
+                      <a:solidFill>
+                        <a:srgbClr val="CCCCCC"/>
+                      </a:solidFill>
+                      <a:prstDash val="solid"/>
+                      <a:round/>
+                      <a:headEnd len="sm" w="sm" type="none"/>
+                      <a:tailEnd len="sm" w="sm" type="none"/>
+                    </a:lnL>
+                    <a:lnR cap="flat" cmpd="sng" w="6350">
+                      <a:solidFill>
+                        <a:srgbClr val="CCCCCC"/>
+                      </a:solidFill>
+                      <a:prstDash val="solid"/>
+                      <a:round/>
+                      <a:headEnd len="sm" w="sm" type="none"/>
+                      <a:tailEnd len="sm" w="sm" type="none"/>
+                    </a:lnR>
+                    <a:lnT cap="flat" cmpd="sng" w="6350">
+                      <a:solidFill>
+                        <a:srgbClr val="CCCCCC"/>
+                      </a:solidFill>
+                      <a:prstDash val="solid"/>
+                      <a:round/>
+                      <a:headEnd len="sm" w="sm" type="none"/>
+                      <a:tailEnd len="sm" w="sm" type="none"/>
+                    </a:lnT>
+                    <a:lnB cap="flat" cmpd="sng" w="6350">
+                      <a:solidFill>
+                        <a:srgbClr val="CCCCCC"/>
+                      </a:solidFill>
+                      <a:prstDash val="solid"/>
+                      <a:round/>
+                      <a:headEnd len="sm" w="sm" type="none"/>
+                      <a:tailEnd len="sm" w="sm" type="none"/>
+                    </a:lnB>
+                  </a:tcPr>
+                </a:tc>
+                <a:tc gridSpan="5">
+                  <a:txBody>
+                    <a:bodyPr/>
+                    <a:lstStyle/>
+                    <a:p>
+                      <a:pPr indent="0" lvl="0" marL="0" rtl="0" algn="l">
+                        <a:lnSpc>
+                          <a:spcPct val="115000"/>
+                        </a:lnSpc>
+                        <a:spcBef>
+                          <a:spcPts val="0"/>
+                        </a:spcBef>
+                        <a:spcAft>
+                          <a:spcPts val="0"/>
+                        </a:spcAft>
+                        <a:buNone/>
+                      </a:pPr>
+                      <a:r>
+                        <a:rPr lang="en" sz="1000"/>
+                        <a:t>Parameters:</a:t>
+                      </a:r>
+                      <a:endParaRPr sz="1000"/>
+                    </a:p>
+                  </a:txBody>
+                  <a:tcPr marT="19050" marB="19050" marR="28575" marL="28575" anchor="b">
+                    <a:lnL cap="flat" cmpd="sng" w="6350">
+                      <a:solidFill>
+                        <a:srgbClr val="CCCCCC"/>
+                      </a:solidFill>
+                      <a:prstDash val="solid"/>
+                      <a:round/>
+                      <a:headEnd len="sm" w="sm" type="none"/>
+                      <a:tailEnd len="sm" w="sm" type="none"/>
+                    </a:lnL>
+                    <a:lnR cap="flat" cmpd="sng" w="6350">
+                      <a:solidFill>
+                        <a:srgbClr val="CCCCCC"/>
+                      </a:solidFill>
+                      <a:prstDash val="solid"/>
+                      <a:round/>
+                      <a:headEnd len="sm" w="sm" type="none"/>
+                      <a:tailEnd len="sm" w="sm" type="none"/>
+                    </a:lnR>
+                    <a:lnT cap="flat" cmpd="sng" w="6350">
+                      <a:solidFill>
+                        <a:srgbClr val="CCCCCC"/>
+                      </a:solidFill>
+                      <a:prstDash val="solid"/>
+                      <a:round/>
+                      <a:headEnd len="sm" w="sm" type="none"/>
+                      <a:tailEnd len="sm" w="sm" type="none"/>
+                    </a:lnT>
+                    <a:lnB cap="flat" cmpd="sng" w="6350">
+                      <a:solidFill>
+                        <a:srgbClr val="CCCCCC"/>
+                      </a:solidFill>
+                      <a:prstDash val="solid"/>
+                      <a:round/>
+                      <a:headEnd len="sm" w="sm" type="none"/>
+                      <a:tailEnd len="sm" w="sm" type="none"/>
+                    </a:lnB>
+                  </a:tcPr>
+                </a:tc>
+                <a:tc hMerge="1"/>
+                <a:tc hMerge="1"/>
+                <a:tc hMerge="1"/>
+                <a:tc hMerge="1"/>
+                <a:tc gridSpan="3">
+                  <a:txBody>
+                    <a:bodyPr/>
+                    <a:lstStyle/>
+                    <a:p>
+                      <a:pPr indent="0" lvl="0" marL="0" rtl="0" algn="l">
+                        <a:lnSpc>
+                          <a:spcPct val="115000"/>
+                        </a:lnSpc>
+                        <a:spcBef>
+                          <a:spcPts val="0"/>
+                        </a:spcBef>
+                        <a:spcAft>
+                          <a:spcPts val="0"/>
+                        </a:spcAft>
+                        <a:buNone/>
+                      </a:pPr>
+                      <a:r>
+                        <a:rPr lang="en" sz="1000"/>
+                        <a:t>% error (blowouts before)</a:t>
+                      </a:r>
+                      <a:endParaRPr sz="1000"/>
+                    </a:p>
+                  </a:txBody>
+                  <a:tcPr marT="19050" marB="19050" marR="28575" marL="28575" anchor="b">
+                    <a:lnL cap="flat" cmpd="sng" w="6350">
+                      <a:solidFill>
+                        <a:srgbClr val="CCCCCC"/>
+                      </a:solidFill>
+                      <a:prstDash val="solid"/>
+                      <a:round/>
+                      <a:headEnd len="sm" w="sm" type="none"/>
+                      <a:tailEnd len="sm" w="sm" type="none"/>
+                    </a:lnL>
+                    <a:lnR cap="flat" cmpd="sng" w="6350">
+                      <a:solidFill>
+                        <a:srgbClr val="CCCCCC"/>
+                      </a:solidFill>
+                      <a:prstDash val="solid"/>
+                      <a:round/>
+                      <a:headEnd len="sm" w="sm" type="none"/>
+                      <a:tailEnd len="sm" w="sm" type="none"/>
+                    </a:lnR>
+                    <a:lnT cap="flat" cmpd="sng" w="6350">
+                      <a:solidFill>
+                        <a:srgbClr val="CCCCCC"/>
+                      </a:solidFill>
+                      <a:prstDash val="solid"/>
+                      <a:round/>
+                      <a:headEnd len="sm" w="sm" type="none"/>
+                      <a:tailEnd len="sm" w="sm" type="none"/>
+                    </a:lnT>
+                    <a:lnB cap="flat" cmpd="sng" w="6350">
+                      <a:solidFill>
+                        <a:srgbClr val="CCCCCC"/>
+                      </a:solidFill>
+                      <a:prstDash val="solid"/>
+                      <a:round/>
+                      <a:headEnd len="sm" w="sm" type="none"/>
+                      <a:tailEnd len="sm" w="sm" type="none"/>
+                    </a:lnB>
+                  </a:tcPr>
+                </a:tc>
+                <a:tc hMerge="1"/>
+                <a:tc hMerge="1"/>
+              </a:tr>
+              <a:tr h="333375">
+                <a:tc>
+                  <a:txBody>
+                    <a:bodyPr/>
+                    <a:lstStyle/>
+                    <a:p>
+                      <a:pPr indent="0" lvl="0" marL="0" rtl="0" algn="l">
+                        <a:lnSpc>
+                          <a:spcPct val="115000"/>
+                        </a:lnSpc>
+                        <a:spcBef>
+                          <a:spcPts val="0"/>
+                        </a:spcBef>
+                        <a:spcAft>
+                          <a:spcPts val="0"/>
+                        </a:spcAft>
+                        <a:buNone/>
+                      </a:pPr>
+                      <a:r>
+                        <a:rPr lang="en" sz="1000"/>
+                        <a:t>Viscosity standard:</a:t>
+                      </a:r>
+                      <a:endParaRPr sz="1000"/>
+                    </a:p>
+                  </a:txBody>
+                  <a:tcPr marT="19050" marB="19050" marR="28575" marL="28575" anchor="b">
+                    <a:lnL cap="flat" cmpd="sng" w="6350">
+                      <a:solidFill>
+                        <a:srgbClr val="CCCCCC"/>
+                      </a:solidFill>
+                      <a:prstDash val="solid"/>
+                      <a:round/>
+                      <a:headEnd len="sm" w="sm" type="none"/>
+                      <a:tailEnd len="sm" w="sm" type="none"/>
+                    </a:lnL>
+                    <a:lnR cap="flat" cmpd="sng" w="6350">
+                      <a:solidFill>
+                        <a:srgbClr val="CCCCCC"/>
+                      </a:solidFill>
+                      <a:prstDash val="solid"/>
+                      <a:round/>
+                      <a:headEnd len="sm" w="sm" type="none"/>
+                      <a:tailEnd len="sm" w="sm" type="none"/>
+                    </a:lnR>
+                    <a:lnT cap="flat" cmpd="sng" w="6350">
+                      <a:solidFill>
+                        <a:srgbClr val="CCCCCC"/>
+                      </a:solidFill>
+                      <a:prstDash val="solid"/>
+                      <a:round/>
+                      <a:headEnd len="sm" w="sm" type="none"/>
+                      <a:tailEnd len="sm" w="sm" type="none"/>
+                    </a:lnT>
+                    <a:lnB cap="flat" cmpd="sng" w="6350">
+                      <a:solidFill>
+                        <a:srgbClr val="CCCCCC"/>
+                      </a:solidFill>
+                      <a:prstDash val="solid"/>
+                      <a:round/>
+                      <a:headEnd len="sm" w="sm" type="none"/>
+                      <a:tailEnd len="sm" w="sm" type="none"/>
+                    </a:lnB>
+                  </a:tcPr>
+                </a:tc>
+                <a:tc>
+                  <a:txBody>
+                    <a:bodyPr/>
+                    <a:lstStyle/>
+                    <a:p>
+                      <a:pPr indent="0" lvl="0" marL="0" rtl="0" algn="l">
+                        <a:lnSpc>
+                          <a:spcPct val="115000"/>
+                        </a:lnSpc>
+                        <a:spcBef>
+                          <a:spcPts val="0"/>
+                        </a:spcBef>
+                        <a:spcAft>
+                          <a:spcPts val="0"/>
+                        </a:spcAft>
+                        <a:buNone/>
+                      </a:pPr>
+                      <a:r>
+                        <a:rPr lang="en" sz="1000"/>
+                        <a:t>Aspiration rate:</a:t>
+                      </a:r>
+                      <a:endParaRPr sz="1000"/>
+                    </a:p>
+                  </a:txBody>
+                  <a:tcPr marT="19050" marB="19050" marR="28575" marL="28575" anchor="b">
+                    <a:lnL cap="flat" cmpd="sng" w="6350">
+                      <a:solidFill>
+                        <a:srgbClr val="CCCCCC"/>
+                      </a:solidFill>
+                      <a:prstDash val="solid"/>
+                      <a:round/>
+                      <a:headEnd len="sm" w="sm" type="none"/>
+                      <a:tailEnd len="sm" w="sm" type="none"/>
+                    </a:lnL>
+                    <a:lnR cap="flat" cmpd="sng" w="6350">
+                      <a:solidFill>
+                        <a:srgbClr val="CCCCCC"/>
+                      </a:solidFill>
+                      <a:prstDash val="solid"/>
+                      <a:round/>
+                      <a:headEnd len="sm" w="sm" type="none"/>
+                      <a:tailEnd len="sm" w="sm" type="none"/>
+                    </a:lnR>
+                    <a:lnT cap="flat" cmpd="sng" w="6350">
+                      <a:solidFill>
+                        <a:srgbClr val="CCCCCC"/>
+                      </a:solidFill>
+                      <a:prstDash val="solid"/>
+                      <a:round/>
+                      <a:headEnd len="sm" w="sm" type="none"/>
+                      <a:tailEnd len="sm" w="sm" type="none"/>
+                    </a:lnT>
+                    <a:lnB cap="flat" cmpd="sng" w="6350">
+                      <a:solidFill>
+                        <a:srgbClr val="CCCCCC"/>
+                      </a:solidFill>
+                      <a:prstDash val="solid"/>
+                      <a:round/>
+                      <a:headEnd len="sm" w="sm" type="none"/>
+                      <a:tailEnd len="sm" w="sm" type="none"/>
+                    </a:lnB>
+                  </a:tcPr>
+                </a:tc>
+                <a:tc>
+                  <a:txBody>
+                    <a:bodyPr/>
+                    <a:lstStyle/>
+                    <a:p>
+                      <a:pPr indent="0" lvl="0" marL="0" rtl="0" algn="l">
+                        <a:lnSpc>
+                          <a:spcPct val="115000"/>
+                        </a:lnSpc>
+                        <a:spcBef>
+                          <a:spcPts val="0"/>
+                        </a:spcBef>
+                        <a:spcAft>
+                          <a:spcPts val="0"/>
+                        </a:spcAft>
+                        <a:buNone/>
+                      </a:pPr>
+                      <a:r>
+                        <a:rPr lang="en" sz="1000"/>
+                        <a:t>Dispense rate:</a:t>
+                      </a:r>
+                      <a:endParaRPr sz="1000"/>
+                    </a:p>
+                  </a:txBody>
+                  <a:tcPr marT="19050" marB="19050" marR="28575" marL="28575" anchor="b">
+                    <a:lnL cap="flat" cmpd="sng" w="6350">
+                      <a:solidFill>
+                        <a:srgbClr val="CCCCCC"/>
+                      </a:solidFill>
+                      <a:prstDash val="solid"/>
+                      <a:round/>
+                      <a:headEnd len="sm" w="sm" type="none"/>
+                      <a:tailEnd len="sm" w="sm" type="none"/>
+                    </a:lnL>
+                    <a:lnR cap="flat" cmpd="sng" w="6350">
+                      <a:solidFill>
+                        <a:srgbClr val="CCCCCC"/>
+                      </a:solidFill>
+                      <a:prstDash val="solid"/>
+                      <a:round/>
+                      <a:headEnd len="sm" w="sm" type="none"/>
+                      <a:tailEnd len="sm" w="sm" type="none"/>
+                    </a:lnR>
+                    <a:lnT cap="flat" cmpd="sng" w="6350">
+                      <a:solidFill>
+                        <a:srgbClr val="CCCCCC"/>
+                      </a:solidFill>
+                      <a:prstDash val="solid"/>
+                      <a:round/>
+                      <a:headEnd len="sm" w="sm" type="none"/>
+                      <a:tailEnd len="sm" w="sm" type="none"/>
+                    </a:lnT>
+                    <a:lnB cap="flat" cmpd="sng" w="6350">
+                      <a:solidFill>
+                        <a:srgbClr val="CCCCCC"/>
+                      </a:solidFill>
+                      <a:prstDash val="solid"/>
+                      <a:round/>
+                      <a:headEnd len="sm" w="sm" type="none"/>
+                      <a:tailEnd len="sm" w="sm" type="none"/>
+                    </a:lnB>
+                  </a:tcPr>
+                </a:tc>
+                <a:tc>
+                  <a:txBody>
+                    <a:bodyPr/>
+                    <a:lstStyle/>
+                    <a:p>
+                      <a:pPr indent="0" lvl="0" marL="0" rtl="0" algn="l">
+                        <a:lnSpc>
+                          <a:spcPct val="115000"/>
+                        </a:lnSpc>
+                        <a:spcBef>
+                          <a:spcPts val="0"/>
+                        </a:spcBef>
+                        <a:spcAft>
+                          <a:spcPts val="0"/>
+                        </a:spcAft>
+                        <a:buNone/>
+                      </a:pPr>
+                      <a:r>
+                        <a:rPr lang="en" sz="1000"/>
+                        <a:t>Delay aspirate:</a:t>
+                      </a:r>
+                      <a:endParaRPr sz="1000"/>
+                    </a:p>
+                  </a:txBody>
+                  <a:tcPr marT="19050" marB="19050" marR="28575" marL="28575" anchor="b">
+                    <a:lnL cap="flat" cmpd="sng" w="6350">
+                      <a:solidFill>
+                        <a:srgbClr val="CCCCCC"/>
+                      </a:solidFill>
+                      <a:prstDash val="solid"/>
+                      <a:round/>
+                      <a:headEnd len="sm" w="sm" type="none"/>
+                      <a:tailEnd len="sm" w="sm" type="none"/>
+                    </a:lnL>
+                    <a:lnR cap="flat" cmpd="sng" w="6350">
+                      <a:solidFill>
+                        <a:srgbClr val="CCCCCC"/>
+                      </a:solidFill>
+                      <a:prstDash val="solid"/>
+                      <a:round/>
+                      <a:headEnd len="sm" w="sm" type="none"/>
+                      <a:tailEnd len="sm" w="sm" type="none"/>
+                    </a:lnR>
+                    <a:lnT cap="flat" cmpd="sng" w="6350">
+                      <a:solidFill>
+                        <a:srgbClr val="CCCCCC"/>
+                      </a:solidFill>
+                      <a:prstDash val="solid"/>
+                      <a:round/>
+                      <a:headEnd len="sm" w="sm" type="none"/>
+                      <a:tailEnd len="sm" w="sm" type="none"/>
+                    </a:lnT>
+                    <a:lnB cap="flat" cmpd="sng" w="6350">
+                      <a:solidFill>
+                        <a:srgbClr val="CCCCCC"/>
+                      </a:solidFill>
+                      <a:prstDash val="solid"/>
+                      <a:round/>
+                      <a:headEnd len="sm" w="sm" type="none"/>
+                      <a:tailEnd len="sm" w="sm" type="none"/>
+                    </a:lnB>
+                  </a:tcPr>
+                </a:tc>
+                <a:tc>
+                  <a:txBody>
+                    <a:bodyPr/>
+                    <a:lstStyle/>
+                    <a:p>
+                      <a:pPr indent="0" lvl="0" marL="0" rtl="0" algn="l">
+                        <a:lnSpc>
+                          <a:spcPct val="115000"/>
+                        </a:lnSpc>
+                        <a:spcBef>
+                          <a:spcPts val="0"/>
+                        </a:spcBef>
+                        <a:spcAft>
+                          <a:spcPts val="0"/>
+                        </a:spcAft>
+                        <a:buNone/>
+                      </a:pPr>
+                      <a:r>
+                        <a:rPr lang="en" sz="1000"/>
+                        <a:t>Delay dispense:</a:t>
+                      </a:r>
+                      <a:endParaRPr sz="1000"/>
+                    </a:p>
+                  </a:txBody>
+                  <a:tcPr marT="19050" marB="19050" marR="28575" marL="28575" anchor="b">
+                    <a:lnL cap="flat" cmpd="sng" w="6350">
+                      <a:solidFill>
+                        <a:srgbClr val="CCCCCC"/>
+                      </a:solidFill>
+                      <a:prstDash val="solid"/>
+                      <a:round/>
+                      <a:headEnd len="sm" w="sm" type="none"/>
+                      <a:tailEnd len="sm" w="sm" type="none"/>
+                    </a:lnL>
+                    <a:lnR cap="flat" cmpd="sng" w="6350">
+                      <a:solidFill>
+                        <a:srgbClr val="CCCCCC"/>
+                      </a:solidFill>
+                      <a:prstDash val="solid"/>
+                      <a:round/>
+                      <a:headEnd len="sm" w="sm" type="none"/>
+                      <a:tailEnd len="sm" w="sm" type="none"/>
+                    </a:lnR>
+                    <a:lnT cap="flat" cmpd="sng" w="6350">
+                      <a:solidFill>
+                        <a:srgbClr val="CCCCCC"/>
+                      </a:solidFill>
+                      <a:prstDash val="solid"/>
+                      <a:round/>
+                      <a:headEnd len="sm" w="sm" type="none"/>
+                      <a:tailEnd len="sm" w="sm" type="none"/>
+                    </a:lnT>
+                    <a:lnB cap="flat" cmpd="sng" w="6350">
+                      <a:solidFill>
+                        <a:srgbClr val="CCCCCC"/>
+                      </a:solidFill>
+                      <a:prstDash val="solid"/>
+                      <a:round/>
+                      <a:headEnd len="sm" w="sm" type="none"/>
+                      <a:tailEnd len="sm" w="sm" type="none"/>
+                    </a:lnB>
+                  </a:tcPr>
+                </a:tc>
+                <a:tc>
+                  <a:txBody>
+                    <a:bodyPr/>
+                    <a:lstStyle/>
+                    <a:p>
+                      <a:pPr indent="0" lvl="0" marL="0" rtl="0" algn="l">
+                        <a:lnSpc>
+                          <a:spcPct val="115000"/>
+                        </a:lnSpc>
+                        <a:spcBef>
+                          <a:spcPts val="0"/>
+                        </a:spcBef>
+                        <a:spcAft>
+                          <a:spcPts val="0"/>
+                        </a:spcAft>
+                        <a:buNone/>
+                      </a:pPr>
+                      <a:r>
+                        <a:rPr lang="en" sz="1000"/>
+                        <a:t>Time for 1000ul</a:t>
+                      </a:r>
+                      <a:endParaRPr sz="1000"/>
+                    </a:p>
+                  </a:txBody>
+                  <a:tcPr marT="19050" marB="19050" marR="28575" marL="28575" anchor="b">
+                    <a:lnL cap="flat" cmpd="sng" w="6350">
+                      <a:solidFill>
+                        <a:srgbClr val="CCCCCC"/>
+                      </a:solidFill>
+                      <a:prstDash val="solid"/>
+                      <a:round/>
+                      <a:headEnd len="sm" w="sm" type="none"/>
+                      <a:tailEnd len="sm" w="sm" type="none"/>
+                    </a:lnL>
+                    <a:lnR cap="flat" cmpd="sng" w="6350">
+                      <a:solidFill>
+                        <a:srgbClr val="CCCCCC"/>
+                      </a:solidFill>
+                      <a:prstDash val="solid"/>
+                      <a:round/>
+                      <a:headEnd len="sm" w="sm" type="none"/>
+                      <a:tailEnd len="sm" w="sm" type="none"/>
+                    </a:lnR>
+                    <a:lnT cap="flat" cmpd="sng" w="6350">
+                      <a:solidFill>
+                        <a:srgbClr val="CCCCCC"/>
+                      </a:solidFill>
+                      <a:prstDash val="solid"/>
+                      <a:round/>
+                      <a:headEnd len="sm" w="sm" type="none"/>
+                      <a:tailEnd len="sm" w="sm" type="none"/>
+                    </a:lnT>
+                    <a:lnB cap="flat" cmpd="sng" w="6350">
+                      <a:solidFill>
+                        <a:srgbClr val="CCCCCC"/>
+                      </a:solidFill>
+                      <a:prstDash val="solid"/>
+                      <a:round/>
+                      <a:headEnd len="sm" w="sm" type="none"/>
+                      <a:tailEnd len="sm" w="sm" type="none"/>
+                    </a:lnB>
+                  </a:tcPr>
+                </a:tc>
+                <a:tc>
+                  <a:txBody>
+                    <a:bodyPr/>
+                    <a:lstStyle/>
+                    <a:p>
+                      <a:pPr indent="0" lvl="0" marL="0" rtl="0" algn="l">
+                        <a:lnSpc>
+                          <a:spcPct val="115000"/>
+                        </a:lnSpc>
+                        <a:spcBef>
+                          <a:spcPts val="0"/>
+                        </a:spcBef>
+                        <a:spcAft>
+                          <a:spcPts val="0"/>
+                        </a:spcAft>
+                        <a:buNone/>
+                      </a:pPr>
+                      <a:r>
+                        <a:rPr lang="en" sz="1000"/>
+                        <a:t>1000(ul)</a:t>
+                      </a:r>
+                      <a:endParaRPr sz="1000"/>
+                    </a:p>
+                  </a:txBody>
+                  <a:tcPr marT="19050" marB="19050" marR="28575" marL="28575" anchor="b">
+                    <a:lnL cap="flat" cmpd="sng" w="6350">
+                      <a:solidFill>
+                        <a:srgbClr val="CCCCCC"/>
+                      </a:solidFill>
+                      <a:prstDash val="solid"/>
+                      <a:round/>
+                      <a:headEnd len="sm" w="sm" type="none"/>
+                      <a:tailEnd len="sm" w="sm" type="none"/>
+                    </a:lnL>
+                    <a:lnR cap="flat" cmpd="sng" w="6350">
+                      <a:solidFill>
+                        <a:srgbClr val="CCCCCC"/>
+                      </a:solidFill>
+                      <a:prstDash val="solid"/>
+                      <a:round/>
+                      <a:headEnd len="sm" w="sm" type="none"/>
+                      <a:tailEnd len="sm" w="sm" type="none"/>
+                    </a:lnR>
+                    <a:lnT cap="flat" cmpd="sng" w="6350">
+                      <a:solidFill>
+                        <a:srgbClr val="CCCCCC"/>
+                      </a:solidFill>
+                      <a:prstDash val="solid"/>
+                      <a:round/>
+                      <a:headEnd len="sm" w="sm" type="none"/>
+                      <a:tailEnd len="sm" w="sm" type="none"/>
+                    </a:lnT>
+                    <a:lnB cap="flat" cmpd="sng" w="6350">
+                      <a:solidFill>
+                        <a:srgbClr val="CCCCCC"/>
+                      </a:solidFill>
+                      <a:prstDash val="solid"/>
+                      <a:round/>
+                      <a:headEnd len="sm" w="sm" type="none"/>
+                      <a:tailEnd len="sm" w="sm" type="none"/>
+                    </a:lnB>
+                  </a:tcPr>
+                </a:tc>
+                <a:tc>
+                  <a:txBody>
+                    <a:bodyPr/>
+                    <a:lstStyle/>
+                    <a:p>
+                      <a:pPr indent="0" lvl="0" marL="0" rtl="0" algn="l">
+                        <a:lnSpc>
+                          <a:spcPct val="115000"/>
+                        </a:lnSpc>
+                        <a:spcBef>
+                          <a:spcPts val="0"/>
+                        </a:spcBef>
+                        <a:spcAft>
+                          <a:spcPts val="0"/>
+                        </a:spcAft>
+                        <a:buNone/>
+                      </a:pPr>
+                      <a:r>
+                        <a:rPr lang="en" sz="1000"/>
+                        <a:t>500(ul)</a:t>
+                      </a:r>
+                      <a:endParaRPr sz="1000"/>
+                    </a:p>
+                  </a:txBody>
+                  <a:tcPr marT="19050" marB="19050" marR="28575" marL="28575" anchor="b">
+                    <a:lnL cap="flat" cmpd="sng" w="6350">
+                      <a:solidFill>
+                        <a:srgbClr val="CCCCCC"/>
+                      </a:solidFill>
+                      <a:prstDash val="solid"/>
+                      <a:round/>
+                      <a:headEnd len="sm" w="sm" type="none"/>
+                      <a:tailEnd len="sm" w="sm" type="none"/>
+                    </a:lnL>
+                    <a:lnR cap="flat" cmpd="sng" w="6350">
+                      <a:solidFill>
+                        <a:srgbClr val="CCCCCC"/>
+                      </a:solidFill>
+                      <a:prstDash val="solid"/>
+                      <a:round/>
+                      <a:headEnd len="sm" w="sm" type="none"/>
+                      <a:tailEnd len="sm" w="sm" type="none"/>
+                    </a:lnR>
+                    <a:lnT cap="flat" cmpd="sng" w="6350">
+                      <a:solidFill>
+                        <a:srgbClr val="CCCCCC"/>
+                      </a:solidFill>
+                      <a:prstDash val="solid"/>
+                      <a:round/>
+                      <a:headEnd len="sm" w="sm" type="none"/>
+                      <a:tailEnd len="sm" w="sm" type="none"/>
+                    </a:lnT>
+                    <a:lnB cap="flat" cmpd="sng" w="6350">
+                      <a:solidFill>
+                        <a:srgbClr val="CCCCCC"/>
+                      </a:solidFill>
+                      <a:prstDash val="solid"/>
+                      <a:round/>
+                      <a:headEnd len="sm" w="sm" type="none"/>
+                      <a:tailEnd len="sm" w="sm" type="none"/>
+                    </a:lnB>
+                  </a:tcPr>
+                </a:tc>
+                <a:tc>
+                  <a:txBody>
+                    <a:bodyPr/>
+                    <a:lstStyle/>
+                    <a:p>
+                      <a:pPr indent="0" lvl="0" marL="0" rtl="0" algn="l">
+                        <a:lnSpc>
+                          <a:spcPct val="115000"/>
+                        </a:lnSpc>
+                        <a:spcBef>
+                          <a:spcPts val="0"/>
+                        </a:spcBef>
+                        <a:spcAft>
+                          <a:spcPts val="0"/>
+                        </a:spcAft>
+                        <a:buNone/>
+                      </a:pPr>
+                      <a:r>
+                        <a:rPr lang="en" sz="1000"/>
+                        <a:t>300(ul)</a:t>
+                      </a:r>
+                      <a:endParaRPr sz="1000"/>
+                    </a:p>
+                  </a:txBody>
+                  <a:tcPr marT="19050" marB="19050" marR="28575" marL="28575" anchor="b">
+                    <a:lnL cap="flat" cmpd="sng" w="6350">
+                      <a:solidFill>
+                        <a:srgbClr val="CCCCCC"/>
+                      </a:solidFill>
+                      <a:prstDash val="solid"/>
+                      <a:round/>
+                      <a:headEnd len="sm" w="sm" type="none"/>
+                      <a:tailEnd len="sm" w="sm" type="none"/>
+                    </a:lnL>
+                    <a:lnR cap="flat" cmpd="sng" w="6350">
+                      <a:solidFill>
+                        <a:srgbClr val="CCCCCC"/>
+                      </a:solidFill>
+                      <a:prstDash val="solid"/>
+                      <a:round/>
+                      <a:headEnd len="sm" w="sm" type="none"/>
+                      <a:tailEnd len="sm" w="sm" type="none"/>
+                    </a:lnR>
+                    <a:lnT cap="flat" cmpd="sng" w="6350">
+                      <a:solidFill>
+                        <a:srgbClr val="CCCCCC"/>
+                      </a:solidFill>
+                      <a:prstDash val="solid"/>
+                      <a:round/>
+                      <a:headEnd len="sm" w="sm" type="none"/>
+                      <a:tailEnd len="sm" w="sm" type="none"/>
+                    </a:lnT>
+                    <a:lnB cap="flat" cmpd="sng" w="6350">
+                      <a:solidFill>
+                        <a:srgbClr val="CCCCCC"/>
+                      </a:solidFill>
+                      <a:prstDash val="solid"/>
+                      <a:round/>
+                      <a:headEnd len="sm" w="sm" type="none"/>
+                      <a:tailEnd len="sm" w="sm" type="none"/>
+                    </a:lnB>
+                  </a:tcPr>
+                </a:tc>
+              </a:tr>
+              <a:tr h="200025">
+                <a:tc>
+                  <a:txBody>
+                    <a:bodyPr/>
+                    <a:lstStyle/>
+                    <a:p>
+                      <a:pPr indent="0" lvl="0" marL="0" rtl="0" algn="r">
+                        <a:lnSpc>
+                          <a:spcPct val="115000"/>
+                        </a:lnSpc>
+                        <a:spcBef>
+                          <a:spcPts val="0"/>
+                        </a:spcBef>
+                        <a:spcAft>
+                          <a:spcPts val="0"/>
+                        </a:spcAft>
+                        <a:buNone/>
+                      </a:pPr>
+                      <a:r>
+                        <a:rPr lang="en" sz="1000"/>
+                        <a:t>1275</a:t>
+                      </a:r>
+                      <a:endParaRPr sz="1000"/>
+                    </a:p>
+                  </a:txBody>
+                  <a:tcPr marT="19050" marB="19050" marR="28575" marL="28575" anchor="b">
+                    <a:lnL cap="flat" cmpd="sng" w="6350">
+                      <a:solidFill>
+                        <a:srgbClr val="CCCCCC"/>
+                      </a:solidFill>
+                      <a:prstDash val="solid"/>
+                      <a:round/>
+                      <a:headEnd len="sm" w="sm" type="none"/>
+                      <a:tailEnd len="sm" w="sm" type="none"/>
+                    </a:lnL>
+                    <a:lnR cap="flat" cmpd="sng" w="6350">
+                      <a:solidFill>
+                        <a:srgbClr val="CCCCCC"/>
+                      </a:solidFill>
+                      <a:prstDash val="solid"/>
+                      <a:round/>
+                      <a:headEnd len="sm" w="sm" type="none"/>
+                      <a:tailEnd len="sm" w="sm" type="none"/>
+                    </a:lnR>
+                    <a:lnT cap="flat" cmpd="sng" w="6350">
+                      <a:solidFill>
+                        <a:srgbClr val="CCCCCC"/>
+                      </a:solidFill>
+                      <a:prstDash val="solid"/>
+                      <a:round/>
+                      <a:headEnd len="sm" w="sm" type="none"/>
+                      <a:tailEnd len="sm" w="sm" type="none"/>
+                    </a:lnT>
+                    <a:lnB cap="flat" cmpd="sng" w="6350">
+                      <a:solidFill>
+                        <a:srgbClr val="CCCCCC"/>
+                      </a:solidFill>
+                      <a:prstDash val="solid"/>
+                      <a:round/>
+                      <a:headEnd len="sm" w="sm" type="none"/>
+                      <a:tailEnd len="sm" w="sm" type="none"/>
+                    </a:lnB>
+                  </a:tcPr>
+                </a:tc>
+                <a:tc>
+                  <a:txBody>
+                    <a:bodyPr/>
+                    <a:lstStyle/>
+                    <a:p>
+                      <a:pPr indent="0" lvl="0" marL="0" rtl="0" algn="r">
+                        <a:lnSpc>
+                          <a:spcPct val="115000"/>
+                        </a:lnSpc>
+                        <a:spcBef>
+                          <a:spcPts val="0"/>
+                        </a:spcBef>
+                        <a:spcAft>
+                          <a:spcPts val="0"/>
+                        </a:spcAft>
+                        <a:buNone/>
+                      </a:pPr>
+                      <a:r>
+                        <a:rPr lang="en" sz="1000"/>
+                        <a:t>4.0</a:t>
+                      </a:r>
+                      <a:endParaRPr sz="1000"/>
+                    </a:p>
+                  </a:txBody>
+                  <a:tcPr marT="19050" marB="19050" marR="28575" marL="28575" anchor="b">
+                    <a:lnL cap="flat" cmpd="sng" w="6350">
+                      <a:solidFill>
+                        <a:srgbClr val="CCCCCC"/>
+                      </a:solidFill>
+                      <a:prstDash val="solid"/>
+                      <a:round/>
+                      <a:headEnd len="sm" w="sm" type="none"/>
+                      <a:tailEnd len="sm" w="sm" type="none"/>
+                    </a:lnL>
+                    <a:lnR cap="flat" cmpd="sng" w="6350">
+                      <a:solidFill>
+                        <a:srgbClr val="CCCCCC"/>
+                      </a:solidFill>
+                      <a:prstDash val="solid"/>
+                      <a:round/>
+                      <a:headEnd len="sm" w="sm" type="none"/>
+                      <a:tailEnd len="sm" w="sm" type="none"/>
+                    </a:lnR>
+                    <a:lnT cap="flat" cmpd="sng" w="6350">
+                      <a:solidFill>
+                        <a:srgbClr val="CCCCCC"/>
+                      </a:solidFill>
+                      <a:prstDash val="solid"/>
+                      <a:round/>
+                      <a:headEnd len="sm" w="sm" type="none"/>
+                      <a:tailEnd len="sm" w="sm" type="none"/>
+                    </a:lnT>
+                    <a:lnB cap="flat" cmpd="sng" w="6350">
+                      <a:solidFill>
+                        <a:srgbClr val="CCCCCC"/>
+                      </a:solidFill>
+                      <a:prstDash val="solid"/>
+                      <a:round/>
+                      <a:headEnd len="sm" w="sm" type="none"/>
+                      <a:tailEnd len="sm" w="sm" type="none"/>
+                    </a:lnB>
+                  </a:tcPr>
+                </a:tc>
+                <a:tc>
+                  <a:txBody>
+                    <a:bodyPr/>
+                    <a:lstStyle/>
+                    <a:p>
+                      <a:pPr indent="0" lvl="0" marL="0" rtl="0" algn="r">
+                        <a:lnSpc>
+                          <a:spcPct val="115000"/>
+                        </a:lnSpc>
+                        <a:spcBef>
+                          <a:spcPts val="0"/>
+                        </a:spcBef>
+                        <a:spcAft>
+                          <a:spcPts val="0"/>
+                        </a:spcAft>
+                        <a:buNone/>
+                      </a:pPr>
+                      <a:r>
+                        <a:rPr lang="en" sz="1000"/>
+                        <a:t>2.5</a:t>
+                      </a:r>
+                      <a:endParaRPr sz="1000"/>
+                    </a:p>
+                  </a:txBody>
+                  <a:tcPr marT="19050" marB="19050" marR="28575" marL="28575" anchor="b">
+                    <a:lnL cap="flat" cmpd="sng" w="6350">
+                      <a:solidFill>
+                        <a:srgbClr val="CCCCCC"/>
+                      </a:solidFill>
+                      <a:prstDash val="solid"/>
+                      <a:round/>
+                      <a:headEnd len="sm" w="sm" type="none"/>
+                      <a:tailEnd len="sm" w="sm" type="none"/>
+                    </a:lnL>
+                    <a:lnR cap="flat" cmpd="sng" w="6350">
+                      <a:solidFill>
+                        <a:srgbClr val="CCCCCC"/>
+                      </a:solidFill>
+                      <a:prstDash val="solid"/>
+                      <a:round/>
+                      <a:headEnd len="sm" w="sm" type="none"/>
+                      <a:tailEnd len="sm" w="sm" type="none"/>
+                    </a:lnR>
+                    <a:lnT cap="flat" cmpd="sng" w="6350">
+                      <a:solidFill>
+                        <a:srgbClr val="CCCCCC"/>
+                      </a:solidFill>
+                      <a:prstDash val="solid"/>
+                      <a:round/>
+                      <a:headEnd len="sm" w="sm" type="none"/>
+                      <a:tailEnd len="sm" w="sm" type="none"/>
+                    </a:lnT>
+                    <a:lnB cap="flat" cmpd="sng" w="6350">
+                      <a:solidFill>
+                        <a:srgbClr val="CCCCCC"/>
+                      </a:solidFill>
+                      <a:prstDash val="solid"/>
+                      <a:round/>
+                      <a:headEnd len="sm" w="sm" type="none"/>
+                      <a:tailEnd len="sm" w="sm" type="none"/>
+                    </a:lnB>
+                  </a:tcPr>
+                </a:tc>
+                <a:tc>
+                  <a:txBody>
+                    <a:bodyPr/>
+                    <a:lstStyle/>
+                    <a:p>
+                      <a:pPr indent="0" lvl="0" marL="0" rtl="0" algn="r">
+                        <a:lnSpc>
+                          <a:spcPct val="115000"/>
+                        </a:lnSpc>
+                        <a:spcBef>
+                          <a:spcPts val="0"/>
+                        </a:spcBef>
+                        <a:spcAft>
+                          <a:spcPts val="0"/>
+                        </a:spcAft>
+                        <a:buNone/>
+                      </a:pPr>
+                      <a:r>
+                        <a:rPr lang="en" sz="1000"/>
+                        <a:t>10</a:t>
+                      </a:r>
+                      <a:endParaRPr sz="1000"/>
+                    </a:p>
+                  </a:txBody>
+                  <a:tcPr marT="19050" marB="19050" marR="28575" marL="28575" anchor="b">
+                    <a:lnL cap="flat" cmpd="sng" w="6350">
+                      <a:solidFill>
+                        <a:srgbClr val="CCCCCC"/>
+                      </a:solidFill>
+                      <a:prstDash val="solid"/>
+                      <a:round/>
+                      <a:headEnd len="sm" w="sm" type="none"/>
+                      <a:tailEnd len="sm" w="sm" type="none"/>
+                    </a:lnL>
+                    <a:lnR cap="flat" cmpd="sng" w="6350">
+                      <a:solidFill>
+                        <a:srgbClr val="CCCCCC"/>
+                      </a:solidFill>
+                      <a:prstDash val="solid"/>
+                      <a:round/>
+                      <a:headEnd len="sm" w="sm" type="none"/>
+                      <a:tailEnd len="sm" w="sm" type="none"/>
+                    </a:lnR>
+                    <a:lnT cap="flat" cmpd="sng" w="6350">
+                      <a:solidFill>
+                        <a:srgbClr val="CCCCCC"/>
+                      </a:solidFill>
+                      <a:prstDash val="solid"/>
+                      <a:round/>
+                      <a:headEnd len="sm" w="sm" type="none"/>
+                      <a:tailEnd len="sm" w="sm" type="none"/>
+                    </a:lnT>
+                    <a:lnB cap="flat" cmpd="sng" w="6350">
+                      <a:solidFill>
+                        <a:srgbClr val="CCCCCC"/>
+                      </a:solidFill>
+                      <a:prstDash val="solid"/>
+                      <a:round/>
+                      <a:headEnd len="sm" w="sm" type="none"/>
+                      <a:tailEnd len="sm" w="sm" type="none"/>
+                    </a:lnB>
+                  </a:tcPr>
+                </a:tc>
+                <a:tc>
+                  <a:txBody>
+                    <a:bodyPr/>
+                    <a:lstStyle/>
+                    <a:p>
+                      <a:pPr indent="0" lvl="0" marL="0" rtl="0" algn="r">
+                        <a:lnSpc>
+                          <a:spcPct val="115000"/>
+                        </a:lnSpc>
+                        <a:spcBef>
+                          <a:spcPts val="0"/>
+                        </a:spcBef>
+                        <a:spcAft>
+                          <a:spcPts val="0"/>
+                        </a:spcAft>
+                        <a:buNone/>
+                      </a:pPr>
+                      <a:r>
+                        <a:rPr lang="en" sz="1000"/>
+                        <a:t>10</a:t>
+                      </a:r>
+                      <a:endParaRPr sz="1000"/>
+                    </a:p>
+                  </a:txBody>
+                  <a:tcPr marT="19050" marB="19050" marR="28575" marL="28575" anchor="b">
+                    <a:lnL cap="flat" cmpd="sng" w="6350">
+                      <a:solidFill>
+                        <a:srgbClr val="CCCCCC"/>
+                      </a:solidFill>
+                      <a:prstDash val="solid"/>
+                      <a:round/>
+                      <a:headEnd len="sm" w="sm" type="none"/>
+                      <a:tailEnd len="sm" w="sm" type="none"/>
+                    </a:lnL>
+                    <a:lnR cap="flat" cmpd="sng" w="6350">
+                      <a:solidFill>
+                        <a:srgbClr val="CCCCCC"/>
+                      </a:solidFill>
+                      <a:prstDash val="solid"/>
+                      <a:round/>
+                      <a:headEnd len="sm" w="sm" type="none"/>
+                      <a:tailEnd len="sm" w="sm" type="none"/>
+                    </a:lnR>
+                    <a:lnT cap="flat" cmpd="sng" w="6350">
+                      <a:solidFill>
+                        <a:srgbClr val="CCCCCC"/>
+                      </a:solidFill>
+                      <a:prstDash val="solid"/>
+                      <a:round/>
+                      <a:headEnd len="sm" w="sm" type="none"/>
+                      <a:tailEnd len="sm" w="sm" type="none"/>
+                    </a:lnT>
+                    <a:lnB cap="flat" cmpd="sng" w="6350">
+                      <a:solidFill>
+                        <a:srgbClr val="CCCCCC"/>
+                      </a:solidFill>
+                      <a:prstDash val="solid"/>
+                      <a:round/>
+                      <a:headEnd len="sm" w="sm" type="none"/>
+                      <a:tailEnd len="sm" w="sm" type="none"/>
+                    </a:lnB>
+                  </a:tcPr>
+                </a:tc>
+                <a:tc>
+                  <a:txBody>
+                    <a:bodyPr/>
+                    <a:lstStyle/>
+                    <a:p>
+                      <a:pPr indent="0" lvl="0" marL="0" rtl="0" algn="r">
+                        <a:lnSpc>
+                          <a:spcPct val="115000"/>
+                        </a:lnSpc>
+                        <a:spcBef>
+                          <a:spcPts val="0"/>
+                        </a:spcBef>
+                        <a:spcAft>
+                          <a:spcPts val="0"/>
+                        </a:spcAft>
+                        <a:buNone/>
+                      </a:pPr>
+                      <a:r>
+                        <a:rPr lang="en" sz="1000"/>
+                        <a:t>670.000000</a:t>
+                      </a:r>
+                      <a:endParaRPr sz="1000"/>
+                    </a:p>
+                  </a:txBody>
+                  <a:tcPr marT="19050" marB="19050" marR="28575" marL="28575" anchor="b">
+                    <a:lnL cap="flat" cmpd="sng" w="6350">
+                      <a:solidFill>
+                        <a:srgbClr val="CCCCCC"/>
+                      </a:solidFill>
+                      <a:prstDash val="solid"/>
+                      <a:round/>
+                      <a:headEnd len="sm" w="sm" type="none"/>
+                      <a:tailEnd len="sm" w="sm" type="none"/>
+                    </a:lnL>
+                    <a:lnR cap="flat" cmpd="sng" w="6350">
+                      <a:solidFill>
+                        <a:srgbClr val="CCCCCC"/>
+                      </a:solidFill>
+                      <a:prstDash val="solid"/>
+                      <a:round/>
+                      <a:headEnd len="sm" w="sm" type="none"/>
+                      <a:tailEnd len="sm" w="sm" type="none"/>
+                    </a:lnR>
+                    <a:lnT cap="flat" cmpd="sng" w="6350">
+                      <a:solidFill>
+                        <a:srgbClr val="CCCCCC"/>
+                      </a:solidFill>
+                      <a:prstDash val="solid"/>
+                      <a:round/>
+                      <a:headEnd len="sm" w="sm" type="none"/>
+                      <a:tailEnd len="sm" w="sm" type="none"/>
+                    </a:lnT>
+                    <a:lnB cap="flat" cmpd="sng" w="6350">
+                      <a:solidFill>
+                        <a:srgbClr val="CCCCCC"/>
+                      </a:solidFill>
+                      <a:prstDash val="solid"/>
+                      <a:round/>
+                      <a:headEnd len="sm" w="sm" type="none"/>
+                      <a:tailEnd len="sm" w="sm" type="none"/>
+                    </a:lnB>
+                  </a:tcPr>
+                </a:tc>
+                <a:tc>
+                  <a:txBody>
+                    <a:bodyPr/>
+                    <a:lstStyle/>
+                    <a:p>
+                      <a:pPr indent="0" lvl="0" marL="0" rtl="0" algn="r">
+                        <a:lnSpc>
+                          <a:spcPct val="115000"/>
+                        </a:lnSpc>
+                        <a:spcBef>
+                          <a:spcPts val="0"/>
+                        </a:spcBef>
+                        <a:spcAft>
+                          <a:spcPts val="0"/>
+                        </a:spcAft>
+                        <a:buNone/>
+                      </a:pPr>
+                      <a:r>
+                        <a:rPr lang="en" sz="1000"/>
+                        <a:t>-2.467078</a:t>
+                      </a:r>
+                      <a:endParaRPr sz="1000"/>
+                    </a:p>
+                  </a:txBody>
+                  <a:tcPr marT="19050" marB="19050" marR="28575" marL="28575" anchor="b">
+                    <a:lnL cap="flat" cmpd="sng" w="6350">
+                      <a:solidFill>
+                        <a:srgbClr val="CCCCCC"/>
+                      </a:solidFill>
+                      <a:prstDash val="solid"/>
+                      <a:round/>
+                      <a:headEnd len="sm" w="sm" type="none"/>
+                      <a:tailEnd len="sm" w="sm" type="none"/>
+                    </a:lnL>
+                    <a:lnR cap="flat" cmpd="sng" w="6350">
+                      <a:solidFill>
+                        <a:srgbClr val="CCCCCC"/>
+                      </a:solidFill>
+                      <a:prstDash val="solid"/>
+                      <a:round/>
+                      <a:headEnd len="sm" w="sm" type="none"/>
+                      <a:tailEnd len="sm" w="sm" type="none"/>
+                    </a:lnR>
+                    <a:lnT cap="flat" cmpd="sng" w="6350">
+                      <a:solidFill>
+                        <a:srgbClr val="CCCCCC"/>
+                      </a:solidFill>
+                      <a:prstDash val="solid"/>
+                      <a:round/>
+                      <a:headEnd len="sm" w="sm" type="none"/>
+                      <a:tailEnd len="sm" w="sm" type="none"/>
+                    </a:lnT>
+                    <a:lnB cap="flat" cmpd="sng" w="6350">
+                      <a:solidFill>
+                        <a:srgbClr val="CCCCCC"/>
+                      </a:solidFill>
+                      <a:prstDash val="solid"/>
+                      <a:round/>
+                      <a:headEnd len="sm" w="sm" type="none"/>
+                      <a:tailEnd len="sm" w="sm" type="none"/>
+                    </a:lnB>
+                  </a:tcPr>
+                </a:tc>
+                <a:tc>
+                  <a:txBody>
+                    <a:bodyPr/>
+                    <a:lstStyle/>
+                    <a:p>
+                      <a:pPr indent="0" lvl="0" marL="0" rtl="0" algn="r">
+                        <a:lnSpc>
+                          <a:spcPct val="115000"/>
+                        </a:lnSpc>
+                        <a:spcBef>
+                          <a:spcPts val="0"/>
+                        </a:spcBef>
+                        <a:spcAft>
+                          <a:spcPts val="0"/>
+                        </a:spcAft>
+                        <a:buNone/>
+                      </a:pPr>
+                      <a:r>
+                        <a:rPr lang="en" sz="1000"/>
+                        <a:t>-3.796428</a:t>
+                      </a:r>
+                      <a:endParaRPr sz="1000"/>
+                    </a:p>
+                  </a:txBody>
+                  <a:tcPr marT="19050" marB="19050" marR="28575" marL="28575" anchor="b">
+                    <a:lnL cap="flat" cmpd="sng" w="6350">
+                      <a:solidFill>
+                        <a:srgbClr val="CCCCCC"/>
+                      </a:solidFill>
+                      <a:prstDash val="solid"/>
+                      <a:round/>
+                      <a:headEnd len="sm" w="sm" type="none"/>
+                      <a:tailEnd len="sm" w="sm" type="none"/>
+                    </a:lnL>
+                    <a:lnR cap="flat" cmpd="sng" w="6350">
+                      <a:solidFill>
+                        <a:srgbClr val="CCCCCC"/>
+                      </a:solidFill>
+                      <a:prstDash val="solid"/>
+                      <a:round/>
+                      <a:headEnd len="sm" w="sm" type="none"/>
+                      <a:tailEnd len="sm" w="sm" type="none"/>
+                    </a:lnR>
+                    <a:lnT cap="flat" cmpd="sng" w="6350">
+                      <a:solidFill>
+                        <a:srgbClr val="CCCCCC"/>
+                      </a:solidFill>
+                      <a:prstDash val="solid"/>
+                      <a:round/>
+                      <a:headEnd len="sm" w="sm" type="none"/>
+                      <a:tailEnd len="sm" w="sm" type="none"/>
+                    </a:lnT>
+                    <a:lnB cap="flat" cmpd="sng" w="6350">
+                      <a:solidFill>
+                        <a:srgbClr val="CCCCCC"/>
+                      </a:solidFill>
+                      <a:prstDash val="solid"/>
+                      <a:round/>
+                      <a:headEnd len="sm" w="sm" type="none"/>
+                      <a:tailEnd len="sm" w="sm" type="none"/>
+                    </a:lnB>
+                  </a:tcPr>
+                </a:tc>
+                <a:tc>
+                  <a:txBody>
+                    <a:bodyPr/>
+                    <a:lstStyle/>
+                    <a:p>
+                      <a:pPr indent="0" lvl="0" marL="0" rtl="0" algn="r">
+                        <a:lnSpc>
+                          <a:spcPct val="115000"/>
+                        </a:lnSpc>
+                        <a:spcBef>
+                          <a:spcPts val="0"/>
+                        </a:spcBef>
+                        <a:spcAft>
+                          <a:spcPts val="0"/>
+                        </a:spcAft>
+                        <a:buNone/>
+                      </a:pPr>
+                      <a:r>
+                        <a:rPr lang="en" sz="1000"/>
+                        <a:t>-2.442059</a:t>
+                      </a:r>
+                      <a:endParaRPr sz="1000"/>
+                    </a:p>
+                  </a:txBody>
+                  <a:tcPr marT="19050" marB="19050" marR="28575" marL="28575" anchor="b">
+                    <a:lnL cap="flat" cmpd="sng" w="6350">
+                      <a:solidFill>
+                        <a:srgbClr val="CCCCCC"/>
+                      </a:solidFill>
+                      <a:prstDash val="solid"/>
+                      <a:round/>
+                      <a:headEnd len="sm" w="sm" type="none"/>
+                      <a:tailEnd len="sm" w="sm" type="none"/>
+                    </a:lnL>
+                    <a:lnR cap="flat" cmpd="sng" w="6350">
+                      <a:solidFill>
+                        <a:srgbClr val="CCCCCC"/>
+                      </a:solidFill>
+                      <a:prstDash val="solid"/>
+                      <a:round/>
+                      <a:headEnd len="sm" w="sm" type="none"/>
+                      <a:tailEnd len="sm" w="sm" type="none"/>
+                    </a:lnR>
+                    <a:lnT cap="flat" cmpd="sng" w="6350">
+                      <a:solidFill>
+                        <a:srgbClr val="CCCCCC"/>
+                      </a:solidFill>
+                      <a:prstDash val="solid"/>
+                      <a:round/>
+                      <a:headEnd len="sm" w="sm" type="none"/>
+                      <a:tailEnd len="sm" w="sm" type="none"/>
+                    </a:lnT>
+                    <a:lnB cap="flat" cmpd="sng" w="6350">
+                      <a:solidFill>
+                        <a:srgbClr val="CCCCCC"/>
+                      </a:solidFill>
+                      <a:prstDash val="solid"/>
+                      <a:round/>
+                      <a:headEnd len="sm" w="sm" type="none"/>
+                      <a:tailEnd len="sm" w="sm" type="none"/>
+                    </a:lnB>
+                  </a:tcPr>
+                </a:tc>
+              </a:tr>
+            </a:tbl>
+          </a:graphicData>
+        </a:graphic>
+      </p:graphicFrame>
+      <p:pic>
+        <p:nvPicPr>
+          <p:cNvPr id="94" name="Google Shape;94;p19"/>
+          <p:cNvPicPr preferRelativeResize="0"/>
+          <p:nvPr/>
+        </p:nvPicPr>
+        <p:blipFill>
+          <a:blip r:embed="rId3">
+            <a:alphaModFix/>
+          </a:blip>
+          <a:stretch>
+            <a:fillRect/>
+          </a:stretch>
+        </p:blipFill>
         <p:spPr>
           <a:xfrm>
-            <a:off x="311700" y="1152475"/>
-            <a:ext cx="8520600" cy="3416400"/>
+            <a:off x="1552425" y="737675"/>
+            <a:ext cx="6039154" cy="3220876"/>
           </a:xfrm>
           <a:prstGeom prst="rect">
             <a:avLst/>
           </a:prstGeom>
+          <a:noFill/>
+          <a:ln>
+            <a:noFill/>
+          </a:ln>
         </p:spPr>
-        <p:txBody>
-          <a:bodyPr anchorCtr="0" anchor="t" bIns="91425" lIns="91425" spcFirstLastPara="1" rIns="91425" wrap="square" tIns="91425">
-            <a:normAutofit/>
-          </a:bodyPr>
-          <a:lstStyle/>
-          <a:p>
-            <a:pPr indent="0" lvl="0" marL="0" rtl="0" algn="l">
-              <a:spcBef>
-                <a:spcPts val="0"/>
-              </a:spcBef>
-              <a:spcAft>
-                <a:spcPts val="1200"/>
-              </a:spcAft>
-              <a:buNone/>
-            </a:pPr>
-            <a:r>
-              <a:t/>
-            </a:r>
-            <a:endParaRPr/>
-          </a:p>
-        </p:txBody>
-      </p:sp>
+      </p:pic>
     </p:spTree>
   </p:cSld>
   <p:clrMapOvr>

</xml_diff>

<commit_message>
updated summary statistics pptx and xlsx
</commit_message>
<xml_diff>
--- a/Sartorious_experiments/Finalised_Data/Sartorious Experiments Summary Statistics.pptx
+++ b/Sartorious_experiments/Finalised_Data/Sartorious Experiments Summary Statistics.pptx
@@ -1192,7 +1192,7 @@
   <p:cSld>
     <p:spTree>
       <p:nvGrpSpPr>
-        <p:cNvPr id="81" name="Shape 81"/>
+        <p:cNvPr id="82" name="Shape 82"/>
         <p:cNvGrpSpPr/>
         <p:nvPr/>
       </p:nvGrpSpPr>
@@ -1206,7 +1206,7 @@
       </p:grpSpPr>
       <p:sp>
         <p:nvSpPr>
-          <p:cNvPr id="82" name="Google Shape;82;g224ff036bbd_0_22:notes"/>
+          <p:cNvPr id="83" name="Google Shape;83;g224ff036bbd_0_22:notes"/>
           <p:cNvSpPr/>
           <p:nvPr>
             <p:ph idx="2" type="sldImg"/>
@@ -1241,7 +1241,7 @@
       </p:sp>
       <p:sp>
         <p:nvSpPr>
-          <p:cNvPr id="83" name="Google Shape;83;g224ff036bbd_0_22:notes"/>
+          <p:cNvPr id="84" name="Google Shape;84;g224ff036bbd_0_22:notes"/>
           <p:cNvSpPr txBox="1"/>
           <p:nvPr>
             <p:ph idx="1" type="body"/>
@@ -1291,7 +1291,7 @@
   <p:cSld>
     <p:spTree>
       <p:nvGrpSpPr>
-        <p:cNvPr id="88" name="Shape 88"/>
+        <p:cNvPr id="89" name="Shape 89"/>
         <p:cNvGrpSpPr/>
         <p:nvPr/>
       </p:nvGrpSpPr>
@@ -1305,7 +1305,7 @@
       </p:grpSpPr>
       <p:sp>
         <p:nvSpPr>
-          <p:cNvPr id="89" name="Google Shape;89;g224ff036bbd_0_27:notes"/>
+          <p:cNvPr id="90" name="Google Shape;90;g224ff036bbd_0_27:notes"/>
           <p:cNvSpPr/>
           <p:nvPr>
             <p:ph idx="2" type="sldImg"/>
@@ -1340,7 +1340,7 @@
       </p:sp>
       <p:sp>
         <p:nvSpPr>
-          <p:cNvPr id="90" name="Google Shape;90;g224ff036bbd_0_27:notes"/>
+          <p:cNvPr id="91" name="Google Shape;91;g224ff036bbd_0_27:notes"/>
           <p:cNvSpPr txBox="1"/>
           <p:nvPr>
             <p:ph idx="1" type="body"/>
@@ -6171,7 +6171,7 @@
             <a:tbl>
               <a:tblPr>
                 <a:noFill/>
-                <a:tableStyleId>{C0094115-561D-4E24-A11C-18F0548FBB05}</a:tableStyleId>
+                <a:tableStyleId>{5A17A027-7B7C-4B92-B48C-391445185AE6}</a:tableStyleId>
               </a:tblPr>
               <a:tblGrid>
                 <a:gridCol w="1109650"/>
@@ -8167,7 +8167,7 @@
                       </a:pPr>
                       <a:r>
                         <a:rPr lang="en" sz="1000"/>
-                        <a:t>20.0</a:t>
+                        <a:t>50.0</a:t>
                       </a:r>
                       <a:endParaRPr sz="1000"/>
                     </a:p>
@@ -8405,7 +8405,10 @@
                     <a:bodyPr/>
                     <a:lstStyle/>
                     <a:p>
-                      <a:pPr indent="0" lvl="0" marL="0" rtl="0" algn="l">
+                      <a:pPr indent="0" lvl="0" marL="0" rtl="0" algn="r">
+                        <a:lnSpc>
+                          <a:spcPct val="115000"/>
+                        </a:lnSpc>
                         <a:spcBef>
                           <a:spcPts val="0"/>
                         </a:spcBef>
@@ -8415,9 +8418,10 @@
                         <a:buNone/>
                       </a:pPr>
                       <a:r>
-                        <a:t/>
+                        <a:rPr lang="en" sz="1000"/>
+                        <a:t>240.000000</a:t>
                       </a:r>
-                      <a:endParaRPr/>
+                      <a:endParaRPr sz="1000"/>
                     </a:p>
                   </a:txBody>
                   <a:tcPr marT="19050" marB="19050" marR="28575" marL="28575" anchor="b">
@@ -8478,7 +8482,7 @@
                       </a:pPr>
                       <a:r>
                         <a:rPr lang="en" sz="1000"/>
-                        <a:t>-2.215764</a:t>
+                        <a:t>-1.031009</a:t>
                       </a:r>
                       <a:endParaRPr sz="1000"/>
                     </a:p>
@@ -8541,7 +8545,7 @@
                       </a:pPr>
                       <a:r>
                         <a:rPr lang="en" sz="1000"/>
-                        <a:t>-1.799589</a:t>
+                        <a:t>-1.581433</a:t>
                       </a:r>
                       <a:endParaRPr sz="1000"/>
                     </a:p>
@@ -8604,7 +8608,7 @@
                       </a:pPr>
                       <a:r>
                         <a:rPr lang="en" sz="1000"/>
-                        <a:t>-4.330199</a:t>
+                        <a:t>-3.491137</a:t>
                       </a:r>
                       <a:endParaRPr sz="1000"/>
                     </a:p>
@@ -9293,7 +9297,10 @@
                     <a:bodyPr/>
                     <a:lstStyle/>
                     <a:p>
-                      <a:pPr indent="0" lvl="0" marL="0" rtl="0" algn="l">
+                      <a:pPr indent="0" lvl="0" marL="0" rtl="0" algn="r">
+                        <a:lnSpc>
+                          <a:spcPct val="115000"/>
+                        </a:lnSpc>
                         <a:spcBef>
                           <a:spcPts val="0"/>
                         </a:spcBef>
@@ -9303,9 +9310,10 @@
                         <a:buNone/>
                       </a:pPr>
                       <a:r>
-                        <a:t/>
+                        <a:rPr lang="en" sz="1000"/>
+                        <a:t>4.0</a:t>
                       </a:r>
-                      <a:endParaRPr/>
+                      <a:endParaRPr sz="1000"/>
                     </a:p>
                   </a:txBody>
                   <a:tcPr marT="19050" marB="19050" marR="28575" marL="28575" anchor="b">
@@ -9352,7 +9360,10 @@
                     <a:bodyPr/>
                     <a:lstStyle/>
                     <a:p>
-                      <a:pPr indent="0" lvl="0" marL="0" rtl="0" algn="l">
+                      <a:pPr indent="0" lvl="0" marL="0" rtl="0" algn="r">
+                        <a:lnSpc>
+                          <a:spcPct val="115000"/>
+                        </a:lnSpc>
                         <a:spcBef>
                           <a:spcPts val="0"/>
                         </a:spcBef>
@@ -9362,9 +9373,10 @@
                         <a:buNone/>
                       </a:pPr>
                       <a:r>
-                        <a:t/>
+                        <a:rPr lang="en" sz="1000"/>
+                        <a:t>2.5</a:t>
                       </a:r>
-                      <a:endParaRPr/>
+                      <a:endParaRPr sz="1000"/>
                     </a:p>
                   </a:txBody>
                   <a:tcPr marT="19050" marB="19050" marR="28575" marL="28575" anchor="b">
@@ -9411,7 +9423,10 @@
                     <a:bodyPr/>
                     <a:lstStyle/>
                     <a:p>
-                      <a:pPr indent="0" lvl="0" marL="0" rtl="0" algn="l">
+                      <a:pPr indent="0" lvl="0" marL="0" rtl="0" algn="r">
+                        <a:lnSpc>
+                          <a:spcPct val="115000"/>
+                        </a:lnSpc>
                         <a:spcBef>
                           <a:spcPts val="0"/>
                         </a:spcBef>
@@ -9421,9 +9436,10 @@
                         <a:buNone/>
                       </a:pPr>
                       <a:r>
-                        <a:t/>
+                        <a:rPr lang="en" sz="1000"/>
+                        <a:t>10</a:t>
                       </a:r>
-                      <a:endParaRPr/>
+                      <a:endParaRPr sz="1000"/>
                     </a:p>
                   </a:txBody>
                   <a:tcPr marT="19050" marB="19050" marR="28575" marL="28575" anchor="b">
@@ -9470,7 +9486,10 @@
                     <a:bodyPr/>
                     <a:lstStyle/>
                     <a:p>
-                      <a:pPr indent="0" lvl="0" marL="0" rtl="0" algn="l">
+                      <a:pPr indent="0" lvl="0" marL="0" rtl="0" algn="r">
+                        <a:lnSpc>
+                          <a:spcPct val="115000"/>
+                        </a:lnSpc>
                         <a:spcBef>
                           <a:spcPts val="0"/>
                         </a:spcBef>
@@ -9480,9 +9499,10 @@
                         <a:buNone/>
                       </a:pPr>
                       <a:r>
-                        <a:t/>
+                        <a:rPr lang="en" sz="1000"/>
+                        <a:t>10</a:t>
                       </a:r>
-                      <a:endParaRPr/>
+                      <a:endParaRPr sz="1000"/>
                     </a:p>
                   </a:txBody>
                   <a:tcPr marT="19050" marB="19050" marR="28575" marL="28575" anchor="b">
@@ -9529,7 +9549,10 @@
                     <a:bodyPr/>
                     <a:lstStyle/>
                     <a:p>
-                      <a:pPr indent="0" lvl="0" marL="0" rtl="0" algn="l">
+                      <a:pPr indent="0" lvl="0" marL="0" rtl="0" algn="r">
+                        <a:lnSpc>
+                          <a:spcPct val="115000"/>
+                        </a:lnSpc>
                         <a:spcBef>
                           <a:spcPts val="0"/>
                         </a:spcBef>
@@ -9539,9 +9562,10 @@
                         <a:buNone/>
                       </a:pPr>
                       <a:r>
-                        <a:t/>
+                        <a:rPr lang="en" sz="1000"/>
+                        <a:t>670.000000</a:t>
                       </a:r>
-                      <a:endParaRPr/>
+                      <a:endParaRPr sz="1000"/>
                     </a:p>
                   </a:txBody>
                   <a:tcPr marT="19050" marB="19050" marR="28575" marL="28575" anchor="b">
@@ -9588,7 +9612,10 @@
                     <a:bodyPr/>
                     <a:lstStyle/>
                     <a:p>
-                      <a:pPr indent="0" lvl="0" marL="0" rtl="0" algn="l">
+                      <a:pPr indent="0" lvl="0" marL="0" rtl="0" algn="r">
+                        <a:lnSpc>
+                          <a:spcPct val="115000"/>
+                        </a:lnSpc>
                         <a:spcBef>
                           <a:spcPts val="0"/>
                         </a:spcBef>
@@ -9598,9 +9625,10 @@
                         <a:buNone/>
                       </a:pPr>
                       <a:r>
-                        <a:t/>
+                        <a:rPr lang="en" sz="1000"/>
+                        <a:t>-2.467078</a:t>
                       </a:r>
-                      <a:endParaRPr/>
+                      <a:endParaRPr sz="1000"/>
                     </a:p>
                   </a:txBody>
                   <a:tcPr marT="19050" marB="19050" marR="28575" marL="28575" anchor="b">
@@ -9647,7 +9675,10 @@
                     <a:bodyPr/>
                     <a:lstStyle/>
                     <a:p>
-                      <a:pPr indent="0" lvl="0" marL="0" rtl="0" algn="l">
+                      <a:pPr indent="0" lvl="0" marL="0" rtl="0" algn="r">
+                        <a:lnSpc>
+                          <a:spcPct val="115000"/>
+                        </a:lnSpc>
                         <a:spcBef>
                           <a:spcPts val="0"/>
                         </a:spcBef>
@@ -9657,9 +9688,10 @@
                         <a:buNone/>
                       </a:pPr>
                       <a:r>
-                        <a:t/>
+                        <a:rPr lang="en" sz="1000"/>
+                        <a:t>-3.796428</a:t>
                       </a:r>
-                      <a:endParaRPr/>
+                      <a:endParaRPr sz="1000"/>
                     </a:p>
                   </a:txBody>
                   <a:tcPr marT="19050" marB="19050" marR="28575" marL="28575" anchor="b">
@@ -9706,7 +9738,10 @@
                     <a:bodyPr/>
                     <a:lstStyle/>
                     <a:p>
-                      <a:pPr indent="0" lvl="0" marL="0" rtl="0" algn="l">
+                      <a:pPr indent="0" lvl="0" marL="0" rtl="0" algn="r">
+                        <a:lnSpc>
+                          <a:spcPct val="115000"/>
+                        </a:lnSpc>
                         <a:spcBef>
                           <a:spcPts val="0"/>
                         </a:spcBef>
@@ -9716,9 +9751,10 @@
                         <a:buNone/>
                       </a:pPr>
                       <a:r>
-                        <a:t/>
+                        <a:rPr lang="en" sz="1000"/>
+                        <a:t>-2.442059</a:t>
                       </a:r>
-                      <a:endParaRPr/>
+                      <a:endParaRPr sz="1000"/>
                     </a:p>
                   </a:txBody>
                   <a:tcPr marT="19050" marB="19050" marR="28575" marL="28575" anchor="b">
@@ -9800,7 +9836,7 @@
         </p:nvSpPr>
         <p:spPr>
           <a:xfrm>
-            <a:off x="311700" y="241025"/>
+            <a:off x="311700" y="153600"/>
             <a:ext cx="8520600" cy="572700"/>
           </a:xfrm>
           <a:prstGeom prst="rect">
@@ -9873,7 +9909,7 @@
             <a:tbl>
               <a:tblPr>
                 <a:noFill/>
-                <a:tableStyleId>{C0094115-561D-4E24-A11C-18F0548FBB05}</a:tableStyleId>
+                <a:tableStyleId>{5A17A027-7B7C-4B92-B48C-391445185AE6}</a:tableStyleId>
               </a:tblPr>
               <a:tblGrid>
                 <a:gridCol w="1095375"/>
@@ -11329,7 +11365,7 @@
             <a:tbl>
               <a:tblPr>
                 <a:noFill/>
-                <a:tableStyleId>{C0094115-561D-4E24-A11C-18F0548FBB05}</a:tableStyleId>
+                <a:tableStyleId>{5A17A027-7B7C-4B92-B48C-391445185AE6}</a:tableStyleId>
               </a:tblPr>
               <a:tblGrid>
                 <a:gridCol w="1095375"/>
@@ -12742,45 +12778,1400 @@
           </a:p>
         </p:txBody>
       </p:sp>
-      <p:sp>
-        <p:nvSpPr>
+      <p:pic>
+        <p:nvPicPr>
           <p:cNvPr id="80" name="Google Shape;80;p17"/>
-          <p:cNvSpPr txBox="1"/>
-          <p:nvPr>
-            <p:ph idx="1" type="body"/>
-          </p:nvPr>
-        </p:nvSpPr>
+          <p:cNvPicPr preferRelativeResize="0"/>
+          <p:nvPr/>
+        </p:nvPicPr>
+        <p:blipFill>
+          <a:blip r:embed="rId3">
+            <a:alphaModFix/>
+          </a:blip>
+          <a:stretch>
+            <a:fillRect/>
+          </a:stretch>
+        </p:blipFill>
         <p:spPr>
           <a:xfrm>
-            <a:off x="311700" y="1152475"/>
-            <a:ext cx="8520600" cy="3416400"/>
+            <a:off x="1596550" y="770025"/>
+            <a:ext cx="5950901" cy="3173800"/>
           </a:xfrm>
           <a:prstGeom prst="rect">
             <a:avLst/>
           </a:prstGeom>
+          <a:noFill/>
+          <a:ln>
+            <a:noFill/>
+          </a:ln>
         </p:spPr>
-        <p:txBody>
-          <a:bodyPr anchorCtr="0" anchor="t" bIns="91425" lIns="91425" spcFirstLastPara="1" rIns="91425" wrap="square" tIns="91425">
-            <a:normAutofit/>
-          </a:bodyPr>
-          <a:lstStyle/>
-          <a:p>
-            <a:pPr indent="0" lvl="0" marL="0" rtl="0" algn="l">
-              <a:spcBef>
-                <a:spcPts val="0"/>
-              </a:spcBef>
-              <a:spcAft>
-                <a:spcPts val="1200"/>
-              </a:spcAft>
-              <a:buNone/>
-            </a:pPr>
-            <a:r>
-              <a:t/>
-            </a:r>
-            <a:endParaRPr/>
-          </a:p>
-        </p:txBody>
-      </p:sp>
+      </p:pic>
+      <p:graphicFrame>
+        <p:nvGraphicFramePr>
+          <p:cNvPr id="81" name="Google Shape;81;p17"/>
+          <p:cNvGraphicFramePr/>
+          <p:nvPr/>
+        </p:nvGraphicFramePr>
+        <p:xfrm>
+          <a:off x="214313" y="3943825"/>
+          <a:ext cx="3000000" cy="3000000"/>
+        </p:xfrm>
+        <a:graphic>
+          <a:graphicData uri="http://schemas.openxmlformats.org/drawingml/2006/table">
+            <a:tbl>
+              <a:tblPr>
+                <a:noFill/>
+                <a:tableStyleId>{5A17A027-7B7C-4B92-B48C-391445185AE6}</a:tableStyleId>
+              </a:tblPr>
+              <a:tblGrid>
+                <a:gridCol w="1095375"/>
+                <a:gridCol w="952500"/>
+                <a:gridCol w="952500"/>
+                <a:gridCol w="952500"/>
+                <a:gridCol w="952500"/>
+                <a:gridCol w="952500"/>
+                <a:gridCol w="952500"/>
+                <a:gridCol w="952500"/>
+                <a:gridCol w="952500"/>
+              </a:tblGrid>
+              <a:tr h="200025">
+                <a:tc>
+                  <a:txBody>
+                    <a:bodyPr/>
+                    <a:lstStyle/>
+                    <a:p>
+                      <a:pPr indent="0" lvl="0" marL="0" rtl="0" algn="l">
+                        <a:spcBef>
+                          <a:spcPts val="0"/>
+                        </a:spcBef>
+                        <a:spcAft>
+                          <a:spcPts val="0"/>
+                        </a:spcAft>
+                        <a:buNone/>
+                      </a:pPr>
+                      <a:r>
+                        <a:t/>
+                      </a:r>
+                      <a:endParaRPr/>
+                    </a:p>
+                  </a:txBody>
+                  <a:tcPr marT="19050" marB="19050" marR="28575" marL="28575" anchor="b">
+                    <a:lnL cap="flat" cmpd="sng" w="6350">
+                      <a:solidFill>
+                        <a:srgbClr val="CCCCCC"/>
+                      </a:solidFill>
+                      <a:prstDash val="solid"/>
+                      <a:round/>
+                      <a:headEnd len="sm" w="sm" type="none"/>
+                      <a:tailEnd len="sm" w="sm" type="none"/>
+                    </a:lnL>
+                    <a:lnR cap="flat" cmpd="sng" w="6350">
+                      <a:solidFill>
+                        <a:srgbClr val="CCCCCC"/>
+                      </a:solidFill>
+                      <a:prstDash val="solid"/>
+                      <a:round/>
+                      <a:headEnd len="sm" w="sm" type="none"/>
+                      <a:tailEnd len="sm" w="sm" type="none"/>
+                    </a:lnR>
+                    <a:lnT cap="flat" cmpd="sng" w="6350">
+                      <a:solidFill>
+                        <a:srgbClr val="CCCCCC"/>
+                      </a:solidFill>
+                      <a:prstDash val="solid"/>
+                      <a:round/>
+                      <a:headEnd len="sm" w="sm" type="none"/>
+                      <a:tailEnd len="sm" w="sm" type="none"/>
+                    </a:lnT>
+                    <a:lnB cap="flat" cmpd="sng" w="6350">
+                      <a:solidFill>
+                        <a:srgbClr val="CCCCCC"/>
+                      </a:solidFill>
+                      <a:prstDash val="solid"/>
+                      <a:round/>
+                      <a:headEnd len="sm" w="sm" type="none"/>
+                      <a:tailEnd len="sm" w="sm" type="none"/>
+                    </a:lnB>
+                  </a:tcPr>
+                </a:tc>
+                <a:tc gridSpan="5">
+                  <a:txBody>
+                    <a:bodyPr/>
+                    <a:lstStyle/>
+                    <a:p>
+                      <a:pPr indent="0" lvl="0" marL="0" rtl="0" algn="l">
+                        <a:lnSpc>
+                          <a:spcPct val="115000"/>
+                        </a:lnSpc>
+                        <a:spcBef>
+                          <a:spcPts val="0"/>
+                        </a:spcBef>
+                        <a:spcAft>
+                          <a:spcPts val="0"/>
+                        </a:spcAft>
+                        <a:buNone/>
+                      </a:pPr>
+                      <a:r>
+                        <a:rPr lang="en" sz="1000"/>
+                        <a:t>Parameters:</a:t>
+                      </a:r>
+                      <a:endParaRPr sz="1000"/>
+                    </a:p>
+                  </a:txBody>
+                  <a:tcPr marT="19050" marB="19050" marR="28575" marL="28575" anchor="b">
+                    <a:lnL cap="flat" cmpd="sng" w="6350">
+                      <a:solidFill>
+                        <a:srgbClr val="CCCCCC"/>
+                      </a:solidFill>
+                      <a:prstDash val="solid"/>
+                      <a:round/>
+                      <a:headEnd len="sm" w="sm" type="none"/>
+                      <a:tailEnd len="sm" w="sm" type="none"/>
+                    </a:lnL>
+                    <a:lnR cap="flat" cmpd="sng" w="6350">
+                      <a:solidFill>
+                        <a:srgbClr val="CCCCCC"/>
+                      </a:solidFill>
+                      <a:prstDash val="solid"/>
+                      <a:round/>
+                      <a:headEnd len="sm" w="sm" type="none"/>
+                      <a:tailEnd len="sm" w="sm" type="none"/>
+                    </a:lnR>
+                    <a:lnT cap="flat" cmpd="sng" w="6350">
+                      <a:solidFill>
+                        <a:srgbClr val="CCCCCC"/>
+                      </a:solidFill>
+                      <a:prstDash val="solid"/>
+                      <a:round/>
+                      <a:headEnd len="sm" w="sm" type="none"/>
+                      <a:tailEnd len="sm" w="sm" type="none"/>
+                    </a:lnT>
+                    <a:lnB cap="flat" cmpd="sng" w="6350">
+                      <a:solidFill>
+                        <a:srgbClr val="CCCCCC"/>
+                      </a:solidFill>
+                      <a:prstDash val="solid"/>
+                      <a:round/>
+                      <a:headEnd len="sm" w="sm" type="none"/>
+                      <a:tailEnd len="sm" w="sm" type="none"/>
+                    </a:lnB>
+                  </a:tcPr>
+                </a:tc>
+                <a:tc hMerge="1"/>
+                <a:tc hMerge="1"/>
+                <a:tc hMerge="1"/>
+                <a:tc hMerge="1"/>
+                <a:tc gridSpan="3">
+                  <a:txBody>
+                    <a:bodyPr/>
+                    <a:lstStyle/>
+                    <a:p>
+                      <a:pPr indent="0" lvl="0" marL="0" rtl="0" algn="l">
+                        <a:lnSpc>
+                          <a:spcPct val="115000"/>
+                        </a:lnSpc>
+                        <a:spcBef>
+                          <a:spcPts val="0"/>
+                        </a:spcBef>
+                        <a:spcAft>
+                          <a:spcPts val="0"/>
+                        </a:spcAft>
+                        <a:buNone/>
+                      </a:pPr>
+                      <a:r>
+                        <a:rPr lang="en" sz="1000"/>
+                        <a:t>% error (blowouts before)</a:t>
+                      </a:r>
+                      <a:endParaRPr sz="1000"/>
+                    </a:p>
+                  </a:txBody>
+                  <a:tcPr marT="19050" marB="19050" marR="28575" marL="28575" anchor="b">
+                    <a:lnL cap="flat" cmpd="sng" w="6350">
+                      <a:solidFill>
+                        <a:srgbClr val="CCCCCC"/>
+                      </a:solidFill>
+                      <a:prstDash val="solid"/>
+                      <a:round/>
+                      <a:headEnd len="sm" w="sm" type="none"/>
+                      <a:tailEnd len="sm" w="sm" type="none"/>
+                    </a:lnL>
+                    <a:lnR cap="flat" cmpd="sng" w="6350">
+                      <a:solidFill>
+                        <a:srgbClr val="CCCCCC"/>
+                      </a:solidFill>
+                      <a:prstDash val="solid"/>
+                      <a:round/>
+                      <a:headEnd len="sm" w="sm" type="none"/>
+                      <a:tailEnd len="sm" w="sm" type="none"/>
+                    </a:lnR>
+                    <a:lnT cap="flat" cmpd="sng" w="6350">
+                      <a:solidFill>
+                        <a:srgbClr val="CCCCCC"/>
+                      </a:solidFill>
+                      <a:prstDash val="solid"/>
+                      <a:round/>
+                      <a:headEnd len="sm" w="sm" type="none"/>
+                      <a:tailEnd len="sm" w="sm" type="none"/>
+                    </a:lnT>
+                    <a:lnB cap="flat" cmpd="sng" w="6350">
+                      <a:solidFill>
+                        <a:srgbClr val="CCCCCC"/>
+                      </a:solidFill>
+                      <a:prstDash val="solid"/>
+                      <a:round/>
+                      <a:headEnd len="sm" w="sm" type="none"/>
+                      <a:tailEnd len="sm" w="sm" type="none"/>
+                    </a:lnB>
+                  </a:tcPr>
+                </a:tc>
+                <a:tc hMerge="1"/>
+                <a:tc hMerge="1"/>
+              </a:tr>
+              <a:tr h="333375">
+                <a:tc>
+                  <a:txBody>
+                    <a:bodyPr/>
+                    <a:lstStyle/>
+                    <a:p>
+                      <a:pPr indent="0" lvl="0" marL="0" rtl="0" algn="l">
+                        <a:lnSpc>
+                          <a:spcPct val="115000"/>
+                        </a:lnSpc>
+                        <a:spcBef>
+                          <a:spcPts val="0"/>
+                        </a:spcBef>
+                        <a:spcAft>
+                          <a:spcPts val="0"/>
+                        </a:spcAft>
+                        <a:buNone/>
+                      </a:pPr>
+                      <a:r>
+                        <a:rPr lang="en" sz="1000"/>
+                        <a:t>Viscosity standard:</a:t>
+                      </a:r>
+                      <a:endParaRPr sz="1000"/>
+                    </a:p>
+                  </a:txBody>
+                  <a:tcPr marT="19050" marB="19050" marR="28575" marL="28575" anchor="b">
+                    <a:lnL cap="flat" cmpd="sng" w="6350">
+                      <a:solidFill>
+                        <a:srgbClr val="CCCCCC"/>
+                      </a:solidFill>
+                      <a:prstDash val="solid"/>
+                      <a:round/>
+                      <a:headEnd len="sm" w="sm" type="none"/>
+                      <a:tailEnd len="sm" w="sm" type="none"/>
+                    </a:lnL>
+                    <a:lnR cap="flat" cmpd="sng" w="6350">
+                      <a:solidFill>
+                        <a:srgbClr val="CCCCCC"/>
+                      </a:solidFill>
+                      <a:prstDash val="solid"/>
+                      <a:round/>
+                      <a:headEnd len="sm" w="sm" type="none"/>
+                      <a:tailEnd len="sm" w="sm" type="none"/>
+                    </a:lnR>
+                    <a:lnT cap="flat" cmpd="sng" w="6350">
+                      <a:solidFill>
+                        <a:srgbClr val="CCCCCC"/>
+                      </a:solidFill>
+                      <a:prstDash val="solid"/>
+                      <a:round/>
+                      <a:headEnd len="sm" w="sm" type="none"/>
+                      <a:tailEnd len="sm" w="sm" type="none"/>
+                    </a:lnT>
+                    <a:lnB cap="flat" cmpd="sng" w="6350">
+                      <a:solidFill>
+                        <a:srgbClr val="CCCCCC"/>
+                      </a:solidFill>
+                      <a:prstDash val="solid"/>
+                      <a:round/>
+                      <a:headEnd len="sm" w="sm" type="none"/>
+                      <a:tailEnd len="sm" w="sm" type="none"/>
+                    </a:lnB>
+                  </a:tcPr>
+                </a:tc>
+                <a:tc>
+                  <a:txBody>
+                    <a:bodyPr/>
+                    <a:lstStyle/>
+                    <a:p>
+                      <a:pPr indent="0" lvl="0" marL="0" rtl="0" algn="l">
+                        <a:lnSpc>
+                          <a:spcPct val="115000"/>
+                        </a:lnSpc>
+                        <a:spcBef>
+                          <a:spcPts val="0"/>
+                        </a:spcBef>
+                        <a:spcAft>
+                          <a:spcPts val="0"/>
+                        </a:spcAft>
+                        <a:buNone/>
+                      </a:pPr>
+                      <a:r>
+                        <a:rPr lang="en" sz="1000"/>
+                        <a:t>Aspiration rate:</a:t>
+                      </a:r>
+                      <a:endParaRPr sz="1000"/>
+                    </a:p>
+                  </a:txBody>
+                  <a:tcPr marT="19050" marB="19050" marR="28575" marL="28575" anchor="b">
+                    <a:lnL cap="flat" cmpd="sng" w="6350">
+                      <a:solidFill>
+                        <a:srgbClr val="CCCCCC"/>
+                      </a:solidFill>
+                      <a:prstDash val="solid"/>
+                      <a:round/>
+                      <a:headEnd len="sm" w="sm" type="none"/>
+                      <a:tailEnd len="sm" w="sm" type="none"/>
+                    </a:lnL>
+                    <a:lnR cap="flat" cmpd="sng" w="6350">
+                      <a:solidFill>
+                        <a:srgbClr val="CCCCCC"/>
+                      </a:solidFill>
+                      <a:prstDash val="solid"/>
+                      <a:round/>
+                      <a:headEnd len="sm" w="sm" type="none"/>
+                      <a:tailEnd len="sm" w="sm" type="none"/>
+                    </a:lnR>
+                    <a:lnT cap="flat" cmpd="sng" w="6350">
+                      <a:solidFill>
+                        <a:srgbClr val="CCCCCC"/>
+                      </a:solidFill>
+                      <a:prstDash val="solid"/>
+                      <a:round/>
+                      <a:headEnd len="sm" w="sm" type="none"/>
+                      <a:tailEnd len="sm" w="sm" type="none"/>
+                    </a:lnT>
+                    <a:lnB cap="flat" cmpd="sng" w="6350">
+                      <a:solidFill>
+                        <a:srgbClr val="CCCCCC"/>
+                      </a:solidFill>
+                      <a:prstDash val="solid"/>
+                      <a:round/>
+                      <a:headEnd len="sm" w="sm" type="none"/>
+                      <a:tailEnd len="sm" w="sm" type="none"/>
+                    </a:lnB>
+                  </a:tcPr>
+                </a:tc>
+                <a:tc>
+                  <a:txBody>
+                    <a:bodyPr/>
+                    <a:lstStyle/>
+                    <a:p>
+                      <a:pPr indent="0" lvl="0" marL="0" rtl="0" algn="l">
+                        <a:lnSpc>
+                          <a:spcPct val="115000"/>
+                        </a:lnSpc>
+                        <a:spcBef>
+                          <a:spcPts val="0"/>
+                        </a:spcBef>
+                        <a:spcAft>
+                          <a:spcPts val="0"/>
+                        </a:spcAft>
+                        <a:buNone/>
+                      </a:pPr>
+                      <a:r>
+                        <a:rPr lang="en" sz="1000"/>
+                        <a:t>Dispense rate:</a:t>
+                      </a:r>
+                      <a:endParaRPr sz="1000"/>
+                    </a:p>
+                  </a:txBody>
+                  <a:tcPr marT="19050" marB="19050" marR="28575" marL="28575" anchor="b">
+                    <a:lnL cap="flat" cmpd="sng" w="6350">
+                      <a:solidFill>
+                        <a:srgbClr val="CCCCCC"/>
+                      </a:solidFill>
+                      <a:prstDash val="solid"/>
+                      <a:round/>
+                      <a:headEnd len="sm" w="sm" type="none"/>
+                      <a:tailEnd len="sm" w="sm" type="none"/>
+                    </a:lnL>
+                    <a:lnR cap="flat" cmpd="sng" w="6350">
+                      <a:solidFill>
+                        <a:srgbClr val="CCCCCC"/>
+                      </a:solidFill>
+                      <a:prstDash val="solid"/>
+                      <a:round/>
+                      <a:headEnd len="sm" w="sm" type="none"/>
+                      <a:tailEnd len="sm" w="sm" type="none"/>
+                    </a:lnR>
+                    <a:lnT cap="flat" cmpd="sng" w="6350">
+                      <a:solidFill>
+                        <a:srgbClr val="CCCCCC"/>
+                      </a:solidFill>
+                      <a:prstDash val="solid"/>
+                      <a:round/>
+                      <a:headEnd len="sm" w="sm" type="none"/>
+                      <a:tailEnd len="sm" w="sm" type="none"/>
+                    </a:lnT>
+                    <a:lnB cap="flat" cmpd="sng" w="6350">
+                      <a:solidFill>
+                        <a:srgbClr val="CCCCCC"/>
+                      </a:solidFill>
+                      <a:prstDash val="solid"/>
+                      <a:round/>
+                      <a:headEnd len="sm" w="sm" type="none"/>
+                      <a:tailEnd len="sm" w="sm" type="none"/>
+                    </a:lnB>
+                  </a:tcPr>
+                </a:tc>
+                <a:tc>
+                  <a:txBody>
+                    <a:bodyPr/>
+                    <a:lstStyle/>
+                    <a:p>
+                      <a:pPr indent="0" lvl="0" marL="0" rtl="0" algn="l">
+                        <a:lnSpc>
+                          <a:spcPct val="115000"/>
+                        </a:lnSpc>
+                        <a:spcBef>
+                          <a:spcPts val="0"/>
+                        </a:spcBef>
+                        <a:spcAft>
+                          <a:spcPts val="0"/>
+                        </a:spcAft>
+                        <a:buNone/>
+                      </a:pPr>
+                      <a:r>
+                        <a:rPr lang="en" sz="1000"/>
+                        <a:t>Delay aspirate:</a:t>
+                      </a:r>
+                      <a:endParaRPr sz="1000"/>
+                    </a:p>
+                  </a:txBody>
+                  <a:tcPr marT="19050" marB="19050" marR="28575" marL="28575" anchor="b">
+                    <a:lnL cap="flat" cmpd="sng" w="6350">
+                      <a:solidFill>
+                        <a:srgbClr val="CCCCCC"/>
+                      </a:solidFill>
+                      <a:prstDash val="solid"/>
+                      <a:round/>
+                      <a:headEnd len="sm" w="sm" type="none"/>
+                      <a:tailEnd len="sm" w="sm" type="none"/>
+                    </a:lnL>
+                    <a:lnR cap="flat" cmpd="sng" w="6350">
+                      <a:solidFill>
+                        <a:srgbClr val="CCCCCC"/>
+                      </a:solidFill>
+                      <a:prstDash val="solid"/>
+                      <a:round/>
+                      <a:headEnd len="sm" w="sm" type="none"/>
+                      <a:tailEnd len="sm" w="sm" type="none"/>
+                    </a:lnR>
+                    <a:lnT cap="flat" cmpd="sng" w="6350">
+                      <a:solidFill>
+                        <a:srgbClr val="CCCCCC"/>
+                      </a:solidFill>
+                      <a:prstDash val="solid"/>
+                      <a:round/>
+                      <a:headEnd len="sm" w="sm" type="none"/>
+                      <a:tailEnd len="sm" w="sm" type="none"/>
+                    </a:lnT>
+                    <a:lnB cap="flat" cmpd="sng" w="6350">
+                      <a:solidFill>
+                        <a:srgbClr val="CCCCCC"/>
+                      </a:solidFill>
+                      <a:prstDash val="solid"/>
+                      <a:round/>
+                      <a:headEnd len="sm" w="sm" type="none"/>
+                      <a:tailEnd len="sm" w="sm" type="none"/>
+                    </a:lnB>
+                  </a:tcPr>
+                </a:tc>
+                <a:tc>
+                  <a:txBody>
+                    <a:bodyPr/>
+                    <a:lstStyle/>
+                    <a:p>
+                      <a:pPr indent="0" lvl="0" marL="0" rtl="0" algn="l">
+                        <a:lnSpc>
+                          <a:spcPct val="115000"/>
+                        </a:lnSpc>
+                        <a:spcBef>
+                          <a:spcPts val="0"/>
+                        </a:spcBef>
+                        <a:spcAft>
+                          <a:spcPts val="0"/>
+                        </a:spcAft>
+                        <a:buNone/>
+                      </a:pPr>
+                      <a:r>
+                        <a:rPr lang="en" sz="1000"/>
+                        <a:t>Delay dispense:</a:t>
+                      </a:r>
+                      <a:endParaRPr sz="1000"/>
+                    </a:p>
+                  </a:txBody>
+                  <a:tcPr marT="19050" marB="19050" marR="28575" marL="28575" anchor="b">
+                    <a:lnL cap="flat" cmpd="sng" w="6350">
+                      <a:solidFill>
+                        <a:srgbClr val="CCCCCC"/>
+                      </a:solidFill>
+                      <a:prstDash val="solid"/>
+                      <a:round/>
+                      <a:headEnd len="sm" w="sm" type="none"/>
+                      <a:tailEnd len="sm" w="sm" type="none"/>
+                    </a:lnL>
+                    <a:lnR cap="flat" cmpd="sng" w="6350">
+                      <a:solidFill>
+                        <a:srgbClr val="CCCCCC"/>
+                      </a:solidFill>
+                      <a:prstDash val="solid"/>
+                      <a:round/>
+                      <a:headEnd len="sm" w="sm" type="none"/>
+                      <a:tailEnd len="sm" w="sm" type="none"/>
+                    </a:lnR>
+                    <a:lnT cap="flat" cmpd="sng" w="6350">
+                      <a:solidFill>
+                        <a:srgbClr val="CCCCCC"/>
+                      </a:solidFill>
+                      <a:prstDash val="solid"/>
+                      <a:round/>
+                      <a:headEnd len="sm" w="sm" type="none"/>
+                      <a:tailEnd len="sm" w="sm" type="none"/>
+                    </a:lnT>
+                    <a:lnB cap="flat" cmpd="sng" w="6350">
+                      <a:solidFill>
+                        <a:srgbClr val="CCCCCC"/>
+                      </a:solidFill>
+                      <a:prstDash val="solid"/>
+                      <a:round/>
+                      <a:headEnd len="sm" w="sm" type="none"/>
+                      <a:tailEnd len="sm" w="sm" type="none"/>
+                    </a:lnB>
+                  </a:tcPr>
+                </a:tc>
+                <a:tc>
+                  <a:txBody>
+                    <a:bodyPr/>
+                    <a:lstStyle/>
+                    <a:p>
+                      <a:pPr indent="0" lvl="0" marL="0" rtl="0" algn="l">
+                        <a:lnSpc>
+                          <a:spcPct val="115000"/>
+                        </a:lnSpc>
+                        <a:spcBef>
+                          <a:spcPts val="0"/>
+                        </a:spcBef>
+                        <a:spcAft>
+                          <a:spcPts val="0"/>
+                        </a:spcAft>
+                        <a:buNone/>
+                      </a:pPr>
+                      <a:r>
+                        <a:rPr lang="en" sz="1000"/>
+                        <a:t>Time for 1000ul</a:t>
+                      </a:r>
+                      <a:endParaRPr sz="1000"/>
+                    </a:p>
+                  </a:txBody>
+                  <a:tcPr marT="19050" marB="19050" marR="28575" marL="28575" anchor="b">
+                    <a:lnL cap="flat" cmpd="sng" w="6350">
+                      <a:solidFill>
+                        <a:srgbClr val="CCCCCC"/>
+                      </a:solidFill>
+                      <a:prstDash val="solid"/>
+                      <a:round/>
+                      <a:headEnd len="sm" w="sm" type="none"/>
+                      <a:tailEnd len="sm" w="sm" type="none"/>
+                    </a:lnL>
+                    <a:lnR cap="flat" cmpd="sng" w="6350">
+                      <a:solidFill>
+                        <a:srgbClr val="CCCCCC"/>
+                      </a:solidFill>
+                      <a:prstDash val="solid"/>
+                      <a:round/>
+                      <a:headEnd len="sm" w="sm" type="none"/>
+                      <a:tailEnd len="sm" w="sm" type="none"/>
+                    </a:lnR>
+                    <a:lnT cap="flat" cmpd="sng" w="6350">
+                      <a:solidFill>
+                        <a:srgbClr val="CCCCCC"/>
+                      </a:solidFill>
+                      <a:prstDash val="solid"/>
+                      <a:round/>
+                      <a:headEnd len="sm" w="sm" type="none"/>
+                      <a:tailEnd len="sm" w="sm" type="none"/>
+                    </a:lnT>
+                    <a:lnB cap="flat" cmpd="sng" w="6350">
+                      <a:solidFill>
+                        <a:srgbClr val="CCCCCC"/>
+                      </a:solidFill>
+                      <a:prstDash val="solid"/>
+                      <a:round/>
+                      <a:headEnd len="sm" w="sm" type="none"/>
+                      <a:tailEnd len="sm" w="sm" type="none"/>
+                    </a:lnB>
+                  </a:tcPr>
+                </a:tc>
+                <a:tc>
+                  <a:txBody>
+                    <a:bodyPr/>
+                    <a:lstStyle/>
+                    <a:p>
+                      <a:pPr indent="0" lvl="0" marL="0" rtl="0" algn="l">
+                        <a:lnSpc>
+                          <a:spcPct val="115000"/>
+                        </a:lnSpc>
+                        <a:spcBef>
+                          <a:spcPts val="0"/>
+                        </a:spcBef>
+                        <a:spcAft>
+                          <a:spcPts val="0"/>
+                        </a:spcAft>
+                        <a:buNone/>
+                      </a:pPr>
+                      <a:r>
+                        <a:rPr lang="en" sz="1000"/>
+                        <a:t>1000(ul)</a:t>
+                      </a:r>
+                      <a:endParaRPr sz="1000"/>
+                    </a:p>
+                  </a:txBody>
+                  <a:tcPr marT="19050" marB="19050" marR="28575" marL="28575" anchor="b">
+                    <a:lnL cap="flat" cmpd="sng" w="6350">
+                      <a:solidFill>
+                        <a:srgbClr val="CCCCCC"/>
+                      </a:solidFill>
+                      <a:prstDash val="solid"/>
+                      <a:round/>
+                      <a:headEnd len="sm" w="sm" type="none"/>
+                      <a:tailEnd len="sm" w="sm" type="none"/>
+                    </a:lnL>
+                    <a:lnR cap="flat" cmpd="sng" w="6350">
+                      <a:solidFill>
+                        <a:srgbClr val="CCCCCC"/>
+                      </a:solidFill>
+                      <a:prstDash val="solid"/>
+                      <a:round/>
+                      <a:headEnd len="sm" w="sm" type="none"/>
+                      <a:tailEnd len="sm" w="sm" type="none"/>
+                    </a:lnR>
+                    <a:lnT cap="flat" cmpd="sng" w="6350">
+                      <a:solidFill>
+                        <a:srgbClr val="CCCCCC"/>
+                      </a:solidFill>
+                      <a:prstDash val="solid"/>
+                      <a:round/>
+                      <a:headEnd len="sm" w="sm" type="none"/>
+                      <a:tailEnd len="sm" w="sm" type="none"/>
+                    </a:lnT>
+                    <a:lnB cap="flat" cmpd="sng" w="6350">
+                      <a:solidFill>
+                        <a:srgbClr val="CCCCCC"/>
+                      </a:solidFill>
+                      <a:prstDash val="solid"/>
+                      <a:round/>
+                      <a:headEnd len="sm" w="sm" type="none"/>
+                      <a:tailEnd len="sm" w="sm" type="none"/>
+                    </a:lnB>
+                  </a:tcPr>
+                </a:tc>
+                <a:tc>
+                  <a:txBody>
+                    <a:bodyPr/>
+                    <a:lstStyle/>
+                    <a:p>
+                      <a:pPr indent="0" lvl="0" marL="0" rtl="0" algn="l">
+                        <a:lnSpc>
+                          <a:spcPct val="115000"/>
+                        </a:lnSpc>
+                        <a:spcBef>
+                          <a:spcPts val="0"/>
+                        </a:spcBef>
+                        <a:spcAft>
+                          <a:spcPts val="0"/>
+                        </a:spcAft>
+                        <a:buNone/>
+                      </a:pPr>
+                      <a:r>
+                        <a:rPr lang="en" sz="1000"/>
+                        <a:t>500(ul)</a:t>
+                      </a:r>
+                      <a:endParaRPr sz="1000"/>
+                    </a:p>
+                  </a:txBody>
+                  <a:tcPr marT="19050" marB="19050" marR="28575" marL="28575" anchor="b">
+                    <a:lnL cap="flat" cmpd="sng" w="6350">
+                      <a:solidFill>
+                        <a:srgbClr val="CCCCCC"/>
+                      </a:solidFill>
+                      <a:prstDash val="solid"/>
+                      <a:round/>
+                      <a:headEnd len="sm" w="sm" type="none"/>
+                      <a:tailEnd len="sm" w="sm" type="none"/>
+                    </a:lnL>
+                    <a:lnR cap="flat" cmpd="sng" w="6350">
+                      <a:solidFill>
+                        <a:srgbClr val="CCCCCC"/>
+                      </a:solidFill>
+                      <a:prstDash val="solid"/>
+                      <a:round/>
+                      <a:headEnd len="sm" w="sm" type="none"/>
+                      <a:tailEnd len="sm" w="sm" type="none"/>
+                    </a:lnR>
+                    <a:lnT cap="flat" cmpd="sng" w="6350">
+                      <a:solidFill>
+                        <a:srgbClr val="CCCCCC"/>
+                      </a:solidFill>
+                      <a:prstDash val="solid"/>
+                      <a:round/>
+                      <a:headEnd len="sm" w="sm" type="none"/>
+                      <a:tailEnd len="sm" w="sm" type="none"/>
+                    </a:lnT>
+                    <a:lnB cap="flat" cmpd="sng" w="6350">
+                      <a:solidFill>
+                        <a:srgbClr val="CCCCCC"/>
+                      </a:solidFill>
+                      <a:prstDash val="solid"/>
+                      <a:round/>
+                      <a:headEnd len="sm" w="sm" type="none"/>
+                      <a:tailEnd len="sm" w="sm" type="none"/>
+                    </a:lnB>
+                  </a:tcPr>
+                </a:tc>
+                <a:tc>
+                  <a:txBody>
+                    <a:bodyPr/>
+                    <a:lstStyle/>
+                    <a:p>
+                      <a:pPr indent="0" lvl="0" marL="0" rtl="0" algn="l">
+                        <a:lnSpc>
+                          <a:spcPct val="115000"/>
+                        </a:lnSpc>
+                        <a:spcBef>
+                          <a:spcPts val="0"/>
+                        </a:spcBef>
+                        <a:spcAft>
+                          <a:spcPts val="0"/>
+                        </a:spcAft>
+                        <a:buNone/>
+                      </a:pPr>
+                      <a:r>
+                        <a:rPr lang="en" sz="1000"/>
+                        <a:t>300(ul)</a:t>
+                      </a:r>
+                      <a:endParaRPr sz="1000"/>
+                    </a:p>
+                  </a:txBody>
+                  <a:tcPr marT="19050" marB="19050" marR="28575" marL="28575" anchor="b">
+                    <a:lnL cap="flat" cmpd="sng" w="6350">
+                      <a:solidFill>
+                        <a:srgbClr val="CCCCCC"/>
+                      </a:solidFill>
+                      <a:prstDash val="solid"/>
+                      <a:round/>
+                      <a:headEnd len="sm" w="sm" type="none"/>
+                      <a:tailEnd len="sm" w="sm" type="none"/>
+                    </a:lnL>
+                    <a:lnR cap="flat" cmpd="sng" w="6350">
+                      <a:solidFill>
+                        <a:srgbClr val="CCCCCC"/>
+                      </a:solidFill>
+                      <a:prstDash val="solid"/>
+                      <a:round/>
+                      <a:headEnd len="sm" w="sm" type="none"/>
+                      <a:tailEnd len="sm" w="sm" type="none"/>
+                    </a:lnR>
+                    <a:lnT cap="flat" cmpd="sng" w="6350">
+                      <a:solidFill>
+                        <a:srgbClr val="CCCCCC"/>
+                      </a:solidFill>
+                      <a:prstDash val="solid"/>
+                      <a:round/>
+                      <a:headEnd len="sm" w="sm" type="none"/>
+                      <a:tailEnd len="sm" w="sm" type="none"/>
+                    </a:lnT>
+                    <a:lnB cap="flat" cmpd="sng" w="6350">
+                      <a:solidFill>
+                        <a:srgbClr val="CCCCCC"/>
+                      </a:solidFill>
+                      <a:prstDash val="solid"/>
+                      <a:round/>
+                      <a:headEnd len="sm" w="sm" type="none"/>
+                      <a:tailEnd len="sm" w="sm" type="none"/>
+                    </a:lnB>
+                  </a:tcPr>
+                </a:tc>
+              </a:tr>
+              <a:tr h="200025">
+                <a:tc>
+                  <a:txBody>
+                    <a:bodyPr/>
+                    <a:lstStyle/>
+                    <a:p>
+                      <a:pPr indent="0" lvl="0" marL="0" rtl="0" algn="r">
+                        <a:lnSpc>
+                          <a:spcPct val="115000"/>
+                        </a:lnSpc>
+                        <a:spcBef>
+                          <a:spcPts val="0"/>
+                        </a:spcBef>
+                        <a:spcAft>
+                          <a:spcPts val="0"/>
+                        </a:spcAft>
+                        <a:buNone/>
+                      </a:pPr>
+                      <a:r>
+                        <a:rPr lang="en" sz="1000"/>
+                        <a:t>505</a:t>
+                      </a:r>
+                      <a:endParaRPr sz="1000"/>
+                    </a:p>
+                  </a:txBody>
+                  <a:tcPr marT="19050" marB="19050" marR="28575" marL="28575" anchor="b">
+                    <a:lnL cap="flat" cmpd="sng" w="6350">
+                      <a:solidFill>
+                        <a:srgbClr val="CCCCCC"/>
+                      </a:solidFill>
+                      <a:prstDash val="solid"/>
+                      <a:round/>
+                      <a:headEnd len="sm" w="sm" type="none"/>
+                      <a:tailEnd len="sm" w="sm" type="none"/>
+                    </a:lnL>
+                    <a:lnR cap="flat" cmpd="sng" w="6350">
+                      <a:solidFill>
+                        <a:srgbClr val="CCCCCC"/>
+                      </a:solidFill>
+                      <a:prstDash val="solid"/>
+                      <a:round/>
+                      <a:headEnd len="sm" w="sm" type="none"/>
+                      <a:tailEnd len="sm" w="sm" type="none"/>
+                    </a:lnR>
+                    <a:lnT cap="flat" cmpd="sng" w="6350">
+                      <a:solidFill>
+                        <a:srgbClr val="CCCCCC"/>
+                      </a:solidFill>
+                      <a:prstDash val="solid"/>
+                      <a:round/>
+                      <a:headEnd len="sm" w="sm" type="none"/>
+                      <a:tailEnd len="sm" w="sm" type="none"/>
+                    </a:lnT>
+                    <a:lnB cap="flat" cmpd="sng" w="6350">
+                      <a:solidFill>
+                        <a:srgbClr val="CCCCCC"/>
+                      </a:solidFill>
+                      <a:prstDash val="solid"/>
+                      <a:round/>
+                      <a:headEnd len="sm" w="sm" type="none"/>
+                      <a:tailEnd len="sm" w="sm" type="none"/>
+                    </a:lnB>
+                  </a:tcPr>
+                </a:tc>
+                <a:tc>
+                  <a:txBody>
+                    <a:bodyPr/>
+                    <a:lstStyle/>
+                    <a:p>
+                      <a:pPr indent="0" lvl="0" marL="0" rtl="0" algn="r">
+                        <a:lnSpc>
+                          <a:spcPct val="115000"/>
+                        </a:lnSpc>
+                        <a:spcBef>
+                          <a:spcPts val="0"/>
+                        </a:spcBef>
+                        <a:spcAft>
+                          <a:spcPts val="0"/>
+                        </a:spcAft>
+                        <a:buNone/>
+                      </a:pPr>
+                      <a:r>
+                        <a:rPr lang="en" sz="1000"/>
+                        <a:t>50.0</a:t>
+                      </a:r>
+                      <a:endParaRPr sz="1000"/>
+                    </a:p>
+                  </a:txBody>
+                  <a:tcPr marT="19050" marB="19050" marR="28575" marL="28575" anchor="b">
+                    <a:lnL cap="flat" cmpd="sng" w="6350">
+                      <a:solidFill>
+                        <a:srgbClr val="CCCCCC"/>
+                      </a:solidFill>
+                      <a:prstDash val="solid"/>
+                      <a:round/>
+                      <a:headEnd len="sm" w="sm" type="none"/>
+                      <a:tailEnd len="sm" w="sm" type="none"/>
+                    </a:lnL>
+                    <a:lnR cap="flat" cmpd="sng" w="6350">
+                      <a:solidFill>
+                        <a:srgbClr val="CCCCCC"/>
+                      </a:solidFill>
+                      <a:prstDash val="solid"/>
+                      <a:round/>
+                      <a:headEnd len="sm" w="sm" type="none"/>
+                      <a:tailEnd len="sm" w="sm" type="none"/>
+                    </a:lnR>
+                    <a:lnT cap="flat" cmpd="sng" w="6350">
+                      <a:solidFill>
+                        <a:srgbClr val="CCCCCC"/>
+                      </a:solidFill>
+                      <a:prstDash val="solid"/>
+                      <a:round/>
+                      <a:headEnd len="sm" w="sm" type="none"/>
+                      <a:tailEnd len="sm" w="sm" type="none"/>
+                    </a:lnT>
+                    <a:lnB cap="flat" cmpd="sng" w="6350">
+                      <a:solidFill>
+                        <a:srgbClr val="CCCCCC"/>
+                      </a:solidFill>
+                      <a:prstDash val="solid"/>
+                      <a:round/>
+                      <a:headEnd len="sm" w="sm" type="none"/>
+                      <a:tailEnd len="sm" w="sm" type="none"/>
+                    </a:lnB>
+                  </a:tcPr>
+                </a:tc>
+                <a:tc>
+                  <a:txBody>
+                    <a:bodyPr/>
+                    <a:lstStyle/>
+                    <a:p>
+                      <a:pPr indent="0" lvl="0" marL="0" rtl="0" algn="r">
+                        <a:lnSpc>
+                          <a:spcPct val="115000"/>
+                        </a:lnSpc>
+                        <a:spcBef>
+                          <a:spcPts val="0"/>
+                        </a:spcBef>
+                        <a:spcAft>
+                          <a:spcPts val="0"/>
+                        </a:spcAft>
+                        <a:buNone/>
+                      </a:pPr>
+                      <a:r>
+                        <a:rPr lang="en" sz="1000"/>
+                        <a:t>5.0</a:t>
+                      </a:r>
+                      <a:endParaRPr sz="1000"/>
+                    </a:p>
+                  </a:txBody>
+                  <a:tcPr marT="19050" marB="19050" marR="28575" marL="28575" anchor="b">
+                    <a:lnL cap="flat" cmpd="sng" w="6350">
+                      <a:solidFill>
+                        <a:srgbClr val="CCCCCC"/>
+                      </a:solidFill>
+                      <a:prstDash val="solid"/>
+                      <a:round/>
+                      <a:headEnd len="sm" w="sm" type="none"/>
+                      <a:tailEnd len="sm" w="sm" type="none"/>
+                    </a:lnL>
+                    <a:lnR cap="flat" cmpd="sng" w="6350">
+                      <a:solidFill>
+                        <a:srgbClr val="CCCCCC"/>
+                      </a:solidFill>
+                      <a:prstDash val="solid"/>
+                      <a:round/>
+                      <a:headEnd len="sm" w="sm" type="none"/>
+                      <a:tailEnd len="sm" w="sm" type="none"/>
+                    </a:lnR>
+                    <a:lnT cap="flat" cmpd="sng" w="6350">
+                      <a:solidFill>
+                        <a:srgbClr val="CCCCCC"/>
+                      </a:solidFill>
+                      <a:prstDash val="solid"/>
+                      <a:round/>
+                      <a:headEnd len="sm" w="sm" type="none"/>
+                      <a:tailEnd len="sm" w="sm" type="none"/>
+                    </a:lnT>
+                    <a:lnB cap="flat" cmpd="sng" w="6350">
+                      <a:solidFill>
+                        <a:srgbClr val="CCCCCC"/>
+                      </a:solidFill>
+                      <a:prstDash val="solid"/>
+                      <a:round/>
+                      <a:headEnd len="sm" w="sm" type="none"/>
+                      <a:tailEnd len="sm" w="sm" type="none"/>
+                    </a:lnB>
+                  </a:tcPr>
+                </a:tc>
+                <a:tc>
+                  <a:txBody>
+                    <a:bodyPr/>
+                    <a:lstStyle/>
+                    <a:p>
+                      <a:pPr indent="0" lvl="0" marL="0" rtl="0" algn="r">
+                        <a:lnSpc>
+                          <a:spcPct val="115000"/>
+                        </a:lnSpc>
+                        <a:spcBef>
+                          <a:spcPts val="0"/>
+                        </a:spcBef>
+                        <a:spcAft>
+                          <a:spcPts val="0"/>
+                        </a:spcAft>
+                        <a:buNone/>
+                      </a:pPr>
+                      <a:r>
+                        <a:rPr lang="en" sz="1000"/>
+                        <a:t>10</a:t>
+                      </a:r>
+                      <a:endParaRPr sz="1000"/>
+                    </a:p>
+                  </a:txBody>
+                  <a:tcPr marT="19050" marB="19050" marR="28575" marL="28575" anchor="b">
+                    <a:lnL cap="flat" cmpd="sng" w="6350">
+                      <a:solidFill>
+                        <a:srgbClr val="CCCCCC"/>
+                      </a:solidFill>
+                      <a:prstDash val="solid"/>
+                      <a:round/>
+                      <a:headEnd len="sm" w="sm" type="none"/>
+                      <a:tailEnd len="sm" w="sm" type="none"/>
+                    </a:lnL>
+                    <a:lnR cap="flat" cmpd="sng" w="6350">
+                      <a:solidFill>
+                        <a:srgbClr val="CCCCCC"/>
+                      </a:solidFill>
+                      <a:prstDash val="solid"/>
+                      <a:round/>
+                      <a:headEnd len="sm" w="sm" type="none"/>
+                      <a:tailEnd len="sm" w="sm" type="none"/>
+                    </a:lnR>
+                    <a:lnT cap="flat" cmpd="sng" w="6350">
+                      <a:solidFill>
+                        <a:srgbClr val="CCCCCC"/>
+                      </a:solidFill>
+                      <a:prstDash val="solid"/>
+                      <a:round/>
+                      <a:headEnd len="sm" w="sm" type="none"/>
+                      <a:tailEnd len="sm" w="sm" type="none"/>
+                    </a:lnT>
+                    <a:lnB cap="flat" cmpd="sng" w="6350">
+                      <a:solidFill>
+                        <a:srgbClr val="CCCCCC"/>
+                      </a:solidFill>
+                      <a:prstDash val="solid"/>
+                      <a:round/>
+                      <a:headEnd len="sm" w="sm" type="none"/>
+                      <a:tailEnd len="sm" w="sm" type="none"/>
+                    </a:lnB>
+                  </a:tcPr>
+                </a:tc>
+                <a:tc>
+                  <a:txBody>
+                    <a:bodyPr/>
+                    <a:lstStyle/>
+                    <a:p>
+                      <a:pPr indent="0" lvl="0" marL="0" rtl="0" algn="r">
+                        <a:lnSpc>
+                          <a:spcPct val="115000"/>
+                        </a:lnSpc>
+                        <a:spcBef>
+                          <a:spcPts val="0"/>
+                        </a:spcBef>
+                        <a:spcAft>
+                          <a:spcPts val="0"/>
+                        </a:spcAft>
+                        <a:buNone/>
+                      </a:pPr>
+                      <a:r>
+                        <a:rPr lang="en" sz="1000"/>
+                        <a:t>10</a:t>
+                      </a:r>
+                      <a:endParaRPr sz="1000"/>
+                    </a:p>
+                  </a:txBody>
+                  <a:tcPr marT="19050" marB="19050" marR="28575" marL="28575" anchor="b">
+                    <a:lnL cap="flat" cmpd="sng" w="6350">
+                      <a:solidFill>
+                        <a:srgbClr val="CCCCCC"/>
+                      </a:solidFill>
+                      <a:prstDash val="solid"/>
+                      <a:round/>
+                      <a:headEnd len="sm" w="sm" type="none"/>
+                      <a:tailEnd len="sm" w="sm" type="none"/>
+                    </a:lnL>
+                    <a:lnR cap="flat" cmpd="sng" w="6350">
+                      <a:solidFill>
+                        <a:srgbClr val="CCCCCC"/>
+                      </a:solidFill>
+                      <a:prstDash val="solid"/>
+                      <a:round/>
+                      <a:headEnd len="sm" w="sm" type="none"/>
+                      <a:tailEnd len="sm" w="sm" type="none"/>
+                    </a:lnR>
+                    <a:lnT cap="flat" cmpd="sng" w="6350">
+                      <a:solidFill>
+                        <a:srgbClr val="CCCCCC"/>
+                      </a:solidFill>
+                      <a:prstDash val="solid"/>
+                      <a:round/>
+                      <a:headEnd len="sm" w="sm" type="none"/>
+                      <a:tailEnd len="sm" w="sm" type="none"/>
+                    </a:lnT>
+                    <a:lnB cap="flat" cmpd="sng" w="6350">
+                      <a:solidFill>
+                        <a:srgbClr val="CCCCCC"/>
+                      </a:solidFill>
+                      <a:prstDash val="solid"/>
+                      <a:round/>
+                      <a:headEnd len="sm" w="sm" type="none"/>
+                      <a:tailEnd len="sm" w="sm" type="none"/>
+                    </a:lnB>
+                  </a:tcPr>
+                </a:tc>
+                <a:tc>
+                  <a:txBody>
+                    <a:bodyPr/>
+                    <a:lstStyle/>
+                    <a:p>
+                      <a:pPr indent="0" lvl="0" marL="0" rtl="0" algn="r">
+                        <a:lnSpc>
+                          <a:spcPct val="115000"/>
+                        </a:lnSpc>
+                        <a:spcBef>
+                          <a:spcPts val="0"/>
+                        </a:spcBef>
+                        <a:spcAft>
+                          <a:spcPts val="0"/>
+                        </a:spcAft>
+                        <a:buNone/>
+                      </a:pPr>
+                      <a:r>
+                        <a:rPr lang="en" sz="1000"/>
+                        <a:t>240.000000</a:t>
+                      </a:r>
+                      <a:endParaRPr sz="1000"/>
+                    </a:p>
+                  </a:txBody>
+                  <a:tcPr marT="19050" marB="19050" marR="28575" marL="28575" anchor="b">
+                    <a:lnL cap="flat" cmpd="sng" w="6350">
+                      <a:solidFill>
+                        <a:srgbClr val="CCCCCC"/>
+                      </a:solidFill>
+                      <a:prstDash val="solid"/>
+                      <a:round/>
+                      <a:headEnd len="sm" w="sm" type="none"/>
+                      <a:tailEnd len="sm" w="sm" type="none"/>
+                    </a:lnL>
+                    <a:lnR cap="flat" cmpd="sng" w="6350">
+                      <a:solidFill>
+                        <a:srgbClr val="CCCCCC"/>
+                      </a:solidFill>
+                      <a:prstDash val="solid"/>
+                      <a:round/>
+                      <a:headEnd len="sm" w="sm" type="none"/>
+                      <a:tailEnd len="sm" w="sm" type="none"/>
+                    </a:lnR>
+                    <a:lnT cap="flat" cmpd="sng" w="6350">
+                      <a:solidFill>
+                        <a:srgbClr val="CCCCCC"/>
+                      </a:solidFill>
+                      <a:prstDash val="solid"/>
+                      <a:round/>
+                      <a:headEnd len="sm" w="sm" type="none"/>
+                      <a:tailEnd len="sm" w="sm" type="none"/>
+                    </a:lnT>
+                    <a:lnB cap="flat" cmpd="sng" w="6350">
+                      <a:solidFill>
+                        <a:srgbClr val="CCCCCC"/>
+                      </a:solidFill>
+                      <a:prstDash val="solid"/>
+                      <a:round/>
+                      <a:headEnd len="sm" w="sm" type="none"/>
+                      <a:tailEnd len="sm" w="sm" type="none"/>
+                    </a:lnB>
+                  </a:tcPr>
+                </a:tc>
+                <a:tc>
+                  <a:txBody>
+                    <a:bodyPr/>
+                    <a:lstStyle/>
+                    <a:p>
+                      <a:pPr indent="0" lvl="0" marL="0" rtl="0" algn="r">
+                        <a:lnSpc>
+                          <a:spcPct val="115000"/>
+                        </a:lnSpc>
+                        <a:spcBef>
+                          <a:spcPts val="0"/>
+                        </a:spcBef>
+                        <a:spcAft>
+                          <a:spcPts val="0"/>
+                        </a:spcAft>
+                        <a:buNone/>
+                      </a:pPr>
+                      <a:r>
+                        <a:rPr lang="en" sz="1000"/>
+                        <a:t>-1.031009</a:t>
+                      </a:r>
+                      <a:endParaRPr sz="1000"/>
+                    </a:p>
+                  </a:txBody>
+                  <a:tcPr marT="19050" marB="19050" marR="28575" marL="28575" anchor="b">
+                    <a:lnL cap="flat" cmpd="sng" w="6350">
+                      <a:solidFill>
+                        <a:srgbClr val="CCCCCC"/>
+                      </a:solidFill>
+                      <a:prstDash val="solid"/>
+                      <a:round/>
+                      <a:headEnd len="sm" w="sm" type="none"/>
+                      <a:tailEnd len="sm" w="sm" type="none"/>
+                    </a:lnL>
+                    <a:lnR cap="flat" cmpd="sng" w="6350">
+                      <a:solidFill>
+                        <a:srgbClr val="CCCCCC"/>
+                      </a:solidFill>
+                      <a:prstDash val="solid"/>
+                      <a:round/>
+                      <a:headEnd len="sm" w="sm" type="none"/>
+                      <a:tailEnd len="sm" w="sm" type="none"/>
+                    </a:lnR>
+                    <a:lnT cap="flat" cmpd="sng" w="6350">
+                      <a:solidFill>
+                        <a:srgbClr val="CCCCCC"/>
+                      </a:solidFill>
+                      <a:prstDash val="solid"/>
+                      <a:round/>
+                      <a:headEnd len="sm" w="sm" type="none"/>
+                      <a:tailEnd len="sm" w="sm" type="none"/>
+                    </a:lnT>
+                    <a:lnB cap="flat" cmpd="sng" w="6350">
+                      <a:solidFill>
+                        <a:srgbClr val="CCCCCC"/>
+                      </a:solidFill>
+                      <a:prstDash val="solid"/>
+                      <a:round/>
+                      <a:headEnd len="sm" w="sm" type="none"/>
+                      <a:tailEnd len="sm" w="sm" type="none"/>
+                    </a:lnB>
+                  </a:tcPr>
+                </a:tc>
+                <a:tc>
+                  <a:txBody>
+                    <a:bodyPr/>
+                    <a:lstStyle/>
+                    <a:p>
+                      <a:pPr indent="0" lvl="0" marL="0" rtl="0" algn="r">
+                        <a:lnSpc>
+                          <a:spcPct val="115000"/>
+                        </a:lnSpc>
+                        <a:spcBef>
+                          <a:spcPts val="0"/>
+                        </a:spcBef>
+                        <a:spcAft>
+                          <a:spcPts val="0"/>
+                        </a:spcAft>
+                        <a:buNone/>
+                      </a:pPr>
+                      <a:r>
+                        <a:rPr lang="en" sz="1000"/>
+                        <a:t>-1.581433</a:t>
+                      </a:r>
+                      <a:endParaRPr sz="1000"/>
+                    </a:p>
+                  </a:txBody>
+                  <a:tcPr marT="19050" marB="19050" marR="28575" marL="28575" anchor="b">
+                    <a:lnL cap="flat" cmpd="sng" w="6350">
+                      <a:solidFill>
+                        <a:srgbClr val="CCCCCC"/>
+                      </a:solidFill>
+                      <a:prstDash val="solid"/>
+                      <a:round/>
+                      <a:headEnd len="sm" w="sm" type="none"/>
+                      <a:tailEnd len="sm" w="sm" type="none"/>
+                    </a:lnL>
+                    <a:lnR cap="flat" cmpd="sng" w="6350">
+                      <a:solidFill>
+                        <a:srgbClr val="CCCCCC"/>
+                      </a:solidFill>
+                      <a:prstDash val="solid"/>
+                      <a:round/>
+                      <a:headEnd len="sm" w="sm" type="none"/>
+                      <a:tailEnd len="sm" w="sm" type="none"/>
+                    </a:lnR>
+                    <a:lnT cap="flat" cmpd="sng" w="6350">
+                      <a:solidFill>
+                        <a:srgbClr val="CCCCCC"/>
+                      </a:solidFill>
+                      <a:prstDash val="solid"/>
+                      <a:round/>
+                      <a:headEnd len="sm" w="sm" type="none"/>
+                      <a:tailEnd len="sm" w="sm" type="none"/>
+                    </a:lnT>
+                    <a:lnB cap="flat" cmpd="sng" w="6350">
+                      <a:solidFill>
+                        <a:srgbClr val="CCCCCC"/>
+                      </a:solidFill>
+                      <a:prstDash val="solid"/>
+                      <a:round/>
+                      <a:headEnd len="sm" w="sm" type="none"/>
+                      <a:tailEnd len="sm" w="sm" type="none"/>
+                    </a:lnB>
+                  </a:tcPr>
+                </a:tc>
+                <a:tc>
+                  <a:txBody>
+                    <a:bodyPr/>
+                    <a:lstStyle/>
+                    <a:p>
+                      <a:pPr indent="0" lvl="0" marL="0" rtl="0" algn="r">
+                        <a:lnSpc>
+                          <a:spcPct val="115000"/>
+                        </a:lnSpc>
+                        <a:spcBef>
+                          <a:spcPts val="0"/>
+                        </a:spcBef>
+                        <a:spcAft>
+                          <a:spcPts val="0"/>
+                        </a:spcAft>
+                        <a:buNone/>
+                      </a:pPr>
+                      <a:r>
+                        <a:rPr lang="en" sz="1000"/>
+                        <a:t>-3.491137</a:t>
+                      </a:r>
+                      <a:endParaRPr sz="1000"/>
+                    </a:p>
+                  </a:txBody>
+                  <a:tcPr marT="19050" marB="19050" marR="28575" marL="28575" anchor="b">
+                    <a:lnL cap="flat" cmpd="sng" w="6350">
+                      <a:solidFill>
+                        <a:srgbClr val="CCCCCC"/>
+                      </a:solidFill>
+                      <a:prstDash val="solid"/>
+                      <a:round/>
+                      <a:headEnd len="sm" w="sm" type="none"/>
+                      <a:tailEnd len="sm" w="sm" type="none"/>
+                    </a:lnL>
+                    <a:lnR cap="flat" cmpd="sng" w="6350">
+                      <a:solidFill>
+                        <a:srgbClr val="CCCCCC"/>
+                      </a:solidFill>
+                      <a:prstDash val="solid"/>
+                      <a:round/>
+                      <a:headEnd len="sm" w="sm" type="none"/>
+                      <a:tailEnd len="sm" w="sm" type="none"/>
+                    </a:lnR>
+                    <a:lnT cap="flat" cmpd="sng" w="6350">
+                      <a:solidFill>
+                        <a:srgbClr val="CCCCCC"/>
+                      </a:solidFill>
+                      <a:prstDash val="solid"/>
+                      <a:round/>
+                      <a:headEnd len="sm" w="sm" type="none"/>
+                      <a:tailEnd len="sm" w="sm" type="none"/>
+                    </a:lnT>
+                    <a:lnB cap="flat" cmpd="sng" w="6350">
+                      <a:solidFill>
+                        <a:srgbClr val="CCCCCC"/>
+                      </a:solidFill>
+                      <a:prstDash val="solid"/>
+                      <a:round/>
+                      <a:headEnd len="sm" w="sm" type="none"/>
+                      <a:tailEnd len="sm" w="sm" type="none"/>
+                    </a:lnB>
+                    <a:solidFill>
+                      <a:srgbClr val="FFFFFF"/>
+                    </a:solidFill>
+                  </a:tcPr>
+                </a:tc>
+              </a:tr>
+            </a:tbl>
+          </a:graphicData>
+        </a:graphic>
+      </p:graphicFrame>
     </p:spTree>
   </p:cSld>
   <p:clrMapOvr>
@@ -12794,7 +14185,7 @@
   <p:cSld>
     <p:spTree>
       <p:nvGrpSpPr>
-        <p:cNvPr id="84" name="Shape 84"/>
+        <p:cNvPr id="85" name="Shape 85"/>
         <p:cNvGrpSpPr/>
         <p:nvPr/>
       </p:nvGrpSpPr>
@@ -12808,7 +14199,7 @@
       </p:grpSpPr>
       <p:sp>
         <p:nvSpPr>
-          <p:cNvPr id="85" name="Google Shape;85;p18"/>
+          <p:cNvPr id="86" name="Google Shape;86;p18"/>
           <p:cNvSpPr txBox="1"/>
           <p:nvPr>
             <p:ph type="title"/>
@@ -12848,17 +14239,16 @@
       </p:sp>
       <p:pic>
         <p:nvPicPr>
-          <p:cNvPr id="86" name="Google Shape;86;p18"/>
+          <p:cNvPr id="87" name="Google Shape;87;p18"/>
           <p:cNvPicPr preferRelativeResize="0"/>
           <p:nvPr/>
         </p:nvPicPr>
-        <p:blipFill>
+        <p:blipFill rotWithShape="1">
           <a:blip r:embed="rId3">
             <a:alphaModFix/>
           </a:blip>
-          <a:stretch>
-            <a:fillRect/>
-          </a:stretch>
+          <a:srcRect b="0" l="0" r="0" t="0"/>
+          <a:stretch/>
         </p:blipFill>
         <p:spPr>
           <a:xfrm>
@@ -12876,7 +14266,7 @@
       </p:pic>
       <p:graphicFrame>
         <p:nvGraphicFramePr>
-          <p:cNvPr id="87" name="Google Shape;87;p18"/>
+          <p:cNvPr id="88" name="Google Shape;88;p18"/>
           <p:cNvGraphicFramePr/>
           <p:nvPr/>
         </p:nvGraphicFramePr>
@@ -12889,7 +14279,7 @@
             <a:tbl>
               <a:tblPr>
                 <a:noFill/>
-                <a:tableStyleId>{C0094115-561D-4E24-A11C-18F0548FBB05}</a:tableStyleId>
+                <a:tableStyleId>{5A17A027-7B7C-4B92-B48C-391445185AE6}</a:tableStyleId>
               </a:tblPr>
               <a:tblGrid>
                 <a:gridCol w="1095375"/>
@@ -14253,7 +15643,7 @@
   <p:cSld>
     <p:spTree>
       <p:nvGrpSpPr>
-        <p:cNvPr id="91" name="Shape 91"/>
+        <p:cNvPr id="92" name="Shape 92"/>
         <p:cNvGrpSpPr/>
         <p:nvPr/>
       </p:nvGrpSpPr>
@@ -14267,7 +15657,7 @@
       </p:grpSpPr>
       <p:sp>
         <p:nvSpPr>
-          <p:cNvPr id="92" name="Google Shape;92;p19"/>
+          <p:cNvPr id="93" name="Google Shape;93;p19"/>
           <p:cNvSpPr txBox="1"/>
           <p:nvPr>
             <p:ph type="title"/>
@@ -14307,7 +15697,7 @@
       </p:sp>
       <p:graphicFrame>
         <p:nvGraphicFramePr>
-          <p:cNvPr id="93" name="Google Shape;93;p19"/>
+          <p:cNvPr id="94" name="Google Shape;94;p19"/>
           <p:cNvGraphicFramePr/>
           <p:nvPr/>
         </p:nvGraphicFramePr>
@@ -14320,7 +15710,7 @@
             <a:tbl>
               <a:tblPr>
                 <a:noFill/>
-                <a:tableStyleId>{C0094115-561D-4E24-A11C-18F0548FBB05}</a:tableStyleId>
+                <a:tableStyleId>{5A17A027-7B7C-4B92-B48C-391445185AE6}</a:tableStyleId>
               </a:tblPr>
               <a:tblGrid>
                 <a:gridCol w="1095375"/>
@@ -15670,7 +17060,7 @@
       </p:graphicFrame>
       <p:pic>
         <p:nvPicPr>
-          <p:cNvPr id="94" name="Google Shape;94;p19"/>
+          <p:cNvPr id="95" name="Google Shape;95;p19"/>
           <p:cNvPicPr preferRelativeResize="0"/>
           <p:nvPr/>
         </p:nvPicPr>
@@ -15705,6 +17095,285 @@
 </file>
 
 <file path=ppt/theme/theme1.xml><?xml version="1.0" encoding="utf-8"?>
+<a:theme xmlns:a="http://schemas.openxmlformats.org/drawingml/2006/main" xmlns:r="http://schemas.openxmlformats.org/officeDocument/2006/relationships">
+  <a:themeElements>
+    <a:clrScheme name="Default">
+      <a:dk1>
+        <a:srgbClr val="000000"/>
+      </a:dk1>
+      <a:lt1>
+        <a:srgbClr val="FFFFFF"/>
+      </a:lt1>
+      <a:dk2>
+        <a:srgbClr val="158158"/>
+      </a:dk2>
+      <a:lt2>
+        <a:srgbClr val="F3F3F3"/>
+      </a:lt2>
+      <a:accent1>
+        <a:srgbClr val="058DC7"/>
+      </a:accent1>
+      <a:accent2>
+        <a:srgbClr val="50B432"/>
+      </a:accent2>
+      <a:accent3>
+        <a:srgbClr val="ED561B"/>
+      </a:accent3>
+      <a:accent4>
+        <a:srgbClr val="EDEF00"/>
+      </a:accent4>
+      <a:accent5>
+        <a:srgbClr val="24CBE5"/>
+      </a:accent5>
+      <a:accent6>
+        <a:srgbClr val="64E572"/>
+      </a:accent6>
+      <a:hlink>
+        <a:srgbClr val="2200CC"/>
+      </a:hlink>
+      <a:folHlink>
+        <a:srgbClr val="551A8B"/>
+      </a:folHlink>
+    </a:clrScheme>
+    <a:fontScheme name="Office">
+      <a:majorFont>
+        <a:latin typeface="Arial"/>
+        <a:ea typeface=""/>
+        <a:cs typeface=""/>
+        <a:font script="Jpan" typeface="ＭＳ Ｐゴシック"/>
+        <a:font script="Hang" typeface="맑은 고딕"/>
+        <a:font script="Hans" typeface="宋体"/>
+        <a:font script="Hant" typeface="新細明體"/>
+        <a:font script="Arab" typeface="Times New Roman"/>
+        <a:font script="Hebr" typeface="Times New Roman"/>
+        <a:font script="Thai" typeface="Angsana New"/>
+        <a:font script="Ethi" typeface="Nyala"/>
+        <a:font script="Beng" typeface="Vrinda"/>
+        <a:font script="Gujr" typeface="Shruti"/>
+        <a:font script="Khmr" typeface="MoolBoran"/>
+        <a:font script="Knda" typeface="Tunga"/>
+        <a:font script="Guru" typeface="Raavi"/>
+        <a:font script="Cans" typeface="Euphemia"/>
+        <a:font script="Cher" typeface="Plantagenet Cherokee"/>
+        <a:font script="Yiii" typeface="Microsoft Yi Baiti"/>
+        <a:font script="Tibt" typeface="Microsoft Himalaya"/>
+        <a:font script="Thaa" typeface="MV Boli"/>
+        <a:font script="Deva" typeface="Mangal"/>
+        <a:font script="Telu" typeface="Gautami"/>
+        <a:font script="Taml" typeface="Latha"/>
+        <a:font script="Syrc" typeface="Estrangelo Edessa"/>
+        <a:font script="Orya" typeface="Kalinga"/>
+        <a:font script="Mlym" typeface="Kartika"/>
+        <a:font script="Laoo" typeface="DokChampa"/>
+        <a:font script="Sinh" typeface="Iskoola Pota"/>
+        <a:font script="Mong" typeface="Mongolian Baiti"/>
+        <a:font script="Viet" typeface="Times New Roman"/>
+        <a:font script="Uigh" typeface="Microsoft Uighur"/>
+        <a:font script="Geor" typeface="Sylfaen"/>
+      </a:majorFont>
+      <a:minorFont>
+        <a:latin typeface="Arial"/>
+        <a:ea typeface=""/>
+        <a:cs typeface=""/>
+        <a:font script="Jpan" typeface="ＭＳ Ｐゴシック"/>
+        <a:font script="Hang" typeface="맑은 고딕"/>
+        <a:font script="Hans" typeface="宋体"/>
+        <a:font script="Hant" typeface="新細明體"/>
+        <a:font script="Arab" typeface="Arial"/>
+        <a:font script="Hebr" typeface="Arial"/>
+        <a:font script="Thai" typeface="Cordia New"/>
+        <a:font script="Ethi" typeface="Nyala"/>
+        <a:font script="Beng" typeface="Vrinda"/>
+        <a:font script="Gujr" typeface="Shruti"/>
+        <a:font script="Khmr" typeface="DaunPenh"/>
+        <a:font script="Knda" typeface="Tunga"/>
+        <a:font script="Guru" typeface="Raavi"/>
+        <a:font script="Cans" typeface="Euphemia"/>
+        <a:font script="Cher" typeface="Plantagenet Cherokee"/>
+        <a:font script="Yiii" typeface="Microsoft Yi Baiti"/>
+        <a:font script="Tibt" typeface="Microsoft Himalaya"/>
+        <a:font script="Thaa" typeface="MV Boli"/>
+        <a:font script="Deva" typeface="Mangal"/>
+        <a:font script="Telu" typeface="Gautami"/>
+        <a:font script="Taml" typeface="Latha"/>
+        <a:font script="Syrc" typeface="Estrangelo Edessa"/>
+        <a:font script="Orya" typeface="Kalinga"/>
+        <a:font script="Mlym" typeface="Kartika"/>
+        <a:font script="Laoo" typeface="DokChampa"/>
+        <a:font script="Sinh" typeface="Iskoola Pota"/>
+        <a:font script="Mong" typeface="Mongolian Baiti"/>
+        <a:font script="Viet" typeface="Arial"/>
+        <a:font script="Uigh" typeface="Microsoft Uighur"/>
+        <a:font script="Geor" typeface="Sylfaen"/>
+      </a:minorFont>
+    </a:fontScheme>
+    <a:fmtScheme name="Office">
+      <a:fillStyleLst>
+        <a:solidFill>
+          <a:schemeClr val="phClr"/>
+        </a:solidFill>
+        <a:gradFill rotWithShape="1">
+          <a:gsLst>
+            <a:gs pos="0">
+              <a:schemeClr val="phClr">
+                <a:tint val="50000"/>
+                <a:satMod val="300000"/>
+              </a:schemeClr>
+            </a:gs>
+            <a:gs pos="35000">
+              <a:schemeClr val="phClr">
+                <a:tint val="37000"/>
+                <a:satMod val="300000"/>
+              </a:schemeClr>
+            </a:gs>
+            <a:gs pos="100000">
+              <a:schemeClr val="phClr">
+                <a:tint val="15000"/>
+                <a:satMod val="350000"/>
+              </a:schemeClr>
+            </a:gs>
+          </a:gsLst>
+          <a:lin ang="16200000" scaled="1"/>
+        </a:gradFill>
+        <a:gradFill rotWithShape="1">
+          <a:gsLst>
+            <a:gs pos="0">
+              <a:schemeClr val="phClr">
+                <a:tint val="100000"/>
+                <a:shade val="100000"/>
+                <a:satMod val="130000"/>
+              </a:schemeClr>
+            </a:gs>
+            <a:gs pos="100000">
+              <a:schemeClr val="phClr">
+                <a:tint val="50000"/>
+                <a:shade val="100000"/>
+                <a:satMod val="350000"/>
+              </a:schemeClr>
+            </a:gs>
+          </a:gsLst>
+          <a:lin ang="16200000" scaled="0"/>
+        </a:gradFill>
+      </a:fillStyleLst>
+      <a:lnStyleLst>
+        <a:ln w="9525" cap="flat" cmpd="sng" algn="ctr">
+          <a:solidFill>
+            <a:schemeClr val="phClr">
+              <a:shade val="95000"/>
+              <a:satMod val="105000"/>
+            </a:schemeClr>
+          </a:solidFill>
+          <a:prstDash val="solid"/>
+        </a:ln>
+        <a:ln w="25400" cap="flat" cmpd="sng" algn="ctr">
+          <a:solidFill>
+            <a:schemeClr val="phClr"/>
+          </a:solidFill>
+          <a:prstDash val="solid"/>
+        </a:ln>
+        <a:ln w="38100" cap="flat" cmpd="sng" algn="ctr">
+          <a:solidFill>
+            <a:schemeClr val="phClr"/>
+          </a:solidFill>
+          <a:prstDash val="solid"/>
+        </a:ln>
+      </a:lnStyleLst>
+      <a:effectStyleLst>
+        <a:effectStyle>
+          <a:effectLst>
+            <a:outerShdw blurRad="40000" dist="20000" dir="5400000" rotWithShape="0">
+              <a:srgbClr val="000000">
+                <a:alpha val="38000"/>
+              </a:srgbClr>
+            </a:outerShdw>
+          </a:effectLst>
+        </a:effectStyle>
+        <a:effectStyle>
+          <a:effectLst>
+            <a:outerShdw blurRad="40000" dist="23000" dir="5400000" rotWithShape="0">
+              <a:srgbClr val="000000">
+                <a:alpha val="35000"/>
+              </a:srgbClr>
+            </a:outerShdw>
+          </a:effectLst>
+        </a:effectStyle>
+        <a:effectStyle>
+          <a:effectLst>
+            <a:outerShdw blurRad="40000" dist="23000" dir="5400000" rotWithShape="0">
+              <a:srgbClr val="000000">
+                <a:alpha val="35000"/>
+              </a:srgbClr>
+            </a:outerShdw>
+          </a:effectLst>
+          <a:scene3d>
+            <a:camera prst="orthographicFront">
+              <a:rot lat="0" lon="0" rev="0"/>
+            </a:camera>
+            <a:lightRig rig="threePt" dir="t">
+              <a:rot lat="0" lon="0" rev="1200000"/>
+            </a:lightRig>
+          </a:scene3d>
+          <a:sp3d>
+            <a:bevelT w="63500" h="25400"/>
+          </a:sp3d>
+        </a:effectStyle>
+      </a:effectStyleLst>
+      <a:bgFillStyleLst>
+        <a:solidFill>
+          <a:schemeClr val="phClr"/>
+        </a:solidFill>
+        <a:gradFill rotWithShape="1">
+          <a:gsLst>
+            <a:gs pos="0">
+              <a:schemeClr val="phClr">
+                <a:tint val="40000"/>
+                <a:satMod val="350000"/>
+              </a:schemeClr>
+            </a:gs>
+            <a:gs pos="40000">
+              <a:schemeClr val="phClr">
+                <a:tint val="45000"/>
+                <a:shade val="99000"/>
+                <a:satMod val="350000"/>
+              </a:schemeClr>
+            </a:gs>
+            <a:gs pos="100000">
+              <a:schemeClr val="phClr">
+                <a:shade val="20000"/>
+                <a:satMod val="255000"/>
+              </a:schemeClr>
+            </a:gs>
+          </a:gsLst>
+          <a:path path="circle">
+            <a:fillToRect l="50000" t="-80000" r="50000" b="180000"/>
+          </a:path>
+        </a:gradFill>
+        <a:gradFill rotWithShape="1">
+          <a:gsLst>
+            <a:gs pos="0">
+              <a:schemeClr val="phClr">
+                <a:tint val="80000"/>
+                <a:satMod val="300000"/>
+              </a:schemeClr>
+            </a:gs>
+            <a:gs pos="100000">
+              <a:schemeClr val="phClr">
+                <a:shade val="30000"/>
+                <a:satMod val="200000"/>
+              </a:schemeClr>
+            </a:gs>
+          </a:gsLst>
+          <a:path path="circle">
+            <a:fillToRect l="50000" t="50000" r="50000" b="50000"/>
+          </a:path>
+        </a:gradFill>
+      </a:bgFillStyleLst>
+    </a:fmtScheme>
+  </a:themeElements>
+</a:theme>
+</file>
+
+<file path=ppt/theme/theme2.xml><?xml version="1.0" encoding="utf-8"?>
 <a:theme xmlns:a="http://schemas.openxmlformats.org/drawingml/2006/main" xmlns:r="http://schemas.openxmlformats.org/officeDocument/2006/relationships" name="Simple Light">
   <a:themeElements>
     <a:clrScheme name="Simple Light">
@@ -15981,283 +17650,4 @@
     </a:fmtScheme>
   </a:themeElements>
 </a:theme>
-</file>
-
-<file path=ppt/theme/theme2.xml><?xml version="1.0" encoding="utf-8"?>
-<a:theme xmlns:a="http://schemas.openxmlformats.org/drawingml/2006/main" xmlns:r="http://schemas.openxmlformats.org/officeDocument/2006/relationships">
-  <a:themeElements>
-    <a:clrScheme name="Default">
-      <a:dk1>
-        <a:srgbClr val="000000"/>
-      </a:dk1>
-      <a:lt1>
-        <a:srgbClr val="FFFFFF"/>
-      </a:lt1>
-      <a:dk2>
-        <a:srgbClr val="158158"/>
-      </a:dk2>
-      <a:lt2>
-        <a:srgbClr val="F3F3F3"/>
-      </a:lt2>
-      <a:accent1>
-        <a:srgbClr val="058DC7"/>
-      </a:accent1>
-      <a:accent2>
-        <a:srgbClr val="50B432"/>
-      </a:accent2>
-      <a:accent3>
-        <a:srgbClr val="ED561B"/>
-      </a:accent3>
-      <a:accent4>
-        <a:srgbClr val="EDEF00"/>
-      </a:accent4>
-      <a:accent5>
-        <a:srgbClr val="24CBE5"/>
-      </a:accent5>
-      <a:accent6>
-        <a:srgbClr val="64E572"/>
-      </a:accent6>
-      <a:hlink>
-        <a:srgbClr val="2200CC"/>
-      </a:hlink>
-      <a:folHlink>
-        <a:srgbClr val="551A8B"/>
-      </a:folHlink>
-    </a:clrScheme>
-    <a:fontScheme name="Office">
-      <a:majorFont>
-        <a:latin typeface="Arial"/>
-        <a:ea typeface=""/>
-        <a:cs typeface=""/>
-        <a:font script="Jpan" typeface="ＭＳ Ｐゴシック"/>
-        <a:font script="Hang" typeface="맑은 고딕"/>
-        <a:font script="Hans" typeface="宋体"/>
-        <a:font script="Hant" typeface="新細明體"/>
-        <a:font script="Arab" typeface="Times New Roman"/>
-        <a:font script="Hebr" typeface="Times New Roman"/>
-        <a:font script="Thai" typeface="Angsana New"/>
-        <a:font script="Ethi" typeface="Nyala"/>
-        <a:font script="Beng" typeface="Vrinda"/>
-        <a:font script="Gujr" typeface="Shruti"/>
-        <a:font script="Khmr" typeface="MoolBoran"/>
-        <a:font script="Knda" typeface="Tunga"/>
-        <a:font script="Guru" typeface="Raavi"/>
-        <a:font script="Cans" typeface="Euphemia"/>
-        <a:font script="Cher" typeface="Plantagenet Cherokee"/>
-        <a:font script="Yiii" typeface="Microsoft Yi Baiti"/>
-        <a:font script="Tibt" typeface="Microsoft Himalaya"/>
-        <a:font script="Thaa" typeface="MV Boli"/>
-        <a:font script="Deva" typeface="Mangal"/>
-        <a:font script="Telu" typeface="Gautami"/>
-        <a:font script="Taml" typeface="Latha"/>
-        <a:font script="Syrc" typeface="Estrangelo Edessa"/>
-        <a:font script="Orya" typeface="Kalinga"/>
-        <a:font script="Mlym" typeface="Kartika"/>
-        <a:font script="Laoo" typeface="DokChampa"/>
-        <a:font script="Sinh" typeface="Iskoola Pota"/>
-        <a:font script="Mong" typeface="Mongolian Baiti"/>
-        <a:font script="Viet" typeface="Times New Roman"/>
-        <a:font script="Uigh" typeface="Microsoft Uighur"/>
-        <a:font script="Geor" typeface="Sylfaen"/>
-      </a:majorFont>
-      <a:minorFont>
-        <a:latin typeface="Arial"/>
-        <a:ea typeface=""/>
-        <a:cs typeface=""/>
-        <a:font script="Jpan" typeface="ＭＳ Ｐゴシック"/>
-        <a:font script="Hang" typeface="맑은 고딕"/>
-        <a:font script="Hans" typeface="宋体"/>
-        <a:font script="Hant" typeface="新細明體"/>
-        <a:font script="Arab" typeface="Arial"/>
-        <a:font script="Hebr" typeface="Arial"/>
-        <a:font script="Thai" typeface="Cordia New"/>
-        <a:font script="Ethi" typeface="Nyala"/>
-        <a:font script="Beng" typeface="Vrinda"/>
-        <a:font script="Gujr" typeface="Shruti"/>
-        <a:font script="Khmr" typeface="DaunPenh"/>
-        <a:font script="Knda" typeface="Tunga"/>
-        <a:font script="Guru" typeface="Raavi"/>
-        <a:font script="Cans" typeface="Euphemia"/>
-        <a:font script="Cher" typeface="Plantagenet Cherokee"/>
-        <a:font script="Yiii" typeface="Microsoft Yi Baiti"/>
-        <a:font script="Tibt" typeface="Microsoft Himalaya"/>
-        <a:font script="Thaa" typeface="MV Boli"/>
-        <a:font script="Deva" typeface="Mangal"/>
-        <a:font script="Telu" typeface="Gautami"/>
-        <a:font script="Taml" typeface="Latha"/>
-        <a:font script="Syrc" typeface="Estrangelo Edessa"/>
-        <a:font script="Orya" typeface="Kalinga"/>
-        <a:font script="Mlym" typeface="Kartika"/>
-        <a:font script="Laoo" typeface="DokChampa"/>
-        <a:font script="Sinh" typeface="Iskoola Pota"/>
-        <a:font script="Mong" typeface="Mongolian Baiti"/>
-        <a:font script="Viet" typeface="Arial"/>
-        <a:font script="Uigh" typeface="Microsoft Uighur"/>
-        <a:font script="Geor" typeface="Sylfaen"/>
-      </a:minorFont>
-    </a:fontScheme>
-    <a:fmtScheme name="Office">
-      <a:fillStyleLst>
-        <a:solidFill>
-          <a:schemeClr val="phClr"/>
-        </a:solidFill>
-        <a:gradFill rotWithShape="1">
-          <a:gsLst>
-            <a:gs pos="0">
-              <a:schemeClr val="phClr">
-                <a:tint val="50000"/>
-                <a:satMod val="300000"/>
-              </a:schemeClr>
-            </a:gs>
-            <a:gs pos="35000">
-              <a:schemeClr val="phClr">
-                <a:tint val="37000"/>
-                <a:satMod val="300000"/>
-              </a:schemeClr>
-            </a:gs>
-            <a:gs pos="100000">
-              <a:schemeClr val="phClr">
-                <a:tint val="15000"/>
-                <a:satMod val="350000"/>
-              </a:schemeClr>
-            </a:gs>
-          </a:gsLst>
-          <a:lin ang="16200000" scaled="1"/>
-        </a:gradFill>
-        <a:gradFill rotWithShape="1">
-          <a:gsLst>
-            <a:gs pos="0">
-              <a:schemeClr val="phClr">
-                <a:tint val="100000"/>
-                <a:shade val="100000"/>
-                <a:satMod val="130000"/>
-              </a:schemeClr>
-            </a:gs>
-            <a:gs pos="100000">
-              <a:schemeClr val="phClr">
-                <a:tint val="50000"/>
-                <a:shade val="100000"/>
-                <a:satMod val="350000"/>
-              </a:schemeClr>
-            </a:gs>
-          </a:gsLst>
-          <a:lin ang="16200000" scaled="0"/>
-        </a:gradFill>
-      </a:fillStyleLst>
-      <a:lnStyleLst>
-        <a:ln w="9525" cap="flat" cmpd="sng" algn="ctr">
-          <a:solidFill>
-            <a:schemeClr val="phClr">
-              <a:shade val="95000"/>
-              <a:satMod val="105000"/>
-            </a:schemeClr>
-          </a:solidFill>
-          <a:prstDash val="solid"/>
-        </a:ln>
-        <a:ln w="25400" cap="flat" cmpd="sng" algn="ctr">
-          <a:solidFill>
-            <a:schemeClr val="phClr"/>
-          </a:solidFill>
-          <a:prstDash val="solid"/>
-        </a:ln>
-        <a:ln w="38100" cap="flat" cmpd="sng" algn="ctr">
-          <a:solidFill>
-            <a:schemeClr val="phClr"/>
-          </a:solidFill>
-          <a:prstDash val="solid"/>
-        </a:ln>
-      </a:lnStyleLst>
-      <a:effectStyleLst>
-        <a:effectStyle>
-          <a:effectLst>
-            <a:outerShdw blurRad="40000" dist="20000" dir="5400000" rotWithShape="0">
-              <a:srgbClr val="000000">
-                <a:alpha val="38000"/>
-              </a:srgbClr>
-            </a:outerShdw>
-          </a:effectLst>
-        </a:effectStyle>
-        <a:effectStyle>
-          <a:effectLst>
-            <a:outerShdw blurRad="40000" dist="23000" dir="5400000" rotWithShape="0">
-              <a:srgbClr val="000000">
-                <a:alpha val="35000"/>
-              </a:srgbClr>
-            </a:outerShdw>
-          </a:effectLst>
-        </a:effectStyle>
-        <a:effectStyle>
-          <a:effectLst>
-            <a:outerShdw blurRad="40000" dist="23000" dir="5400000" rotWithShape="0">
-              <a:srgbClr val="000000">
-                <a:alpha val="35000"/>
-              </a:srgbClr>
-            </a:outerShdw>
-          </a:effectLst>
-          <a:scene3d>
-            <a:camera prst="orthographicFront">
-              <a:rot lat="0" lon="0" rev="0"/>
-            </a:camera>
-            <a:lightRig rig="threePt" dir="t">
-              <a:rot lat="0" lon="0" rev="1200000"/>
-            </a:lightRig>
-          </a:scene3d>
-          <a:sp3d>
-            <a:bevelT w="63500" h="25400"/>
-          </a:sp3d>
-        </a:effectStyle>
-      </a:effectStyleLst>
-      <a:bgFillStyleLst>
-        <a:solidFill>
-          <a:schemeClr val="phClr"/>
-        </a:solidFill>
-        <a:gradFill rotWithShape="1">
-          <a:gsLst>
-            <a:gs pos="0">
-              <a:schemeClr val="phClr">
-                <a:tint val="40000"/>
-                <a:satMod val="350000"/>
-              </a:schemeClr>
-            </a:gs>
-            <a:gs pos="40000">
-              <a:schemeClr val="phClr">
-                <a:tint val="45000"/>
-                <a:shade val="99000"/>
-                <a:satMod val="350000"/>
-              </a:schemeClr>
-            </a:gs>
-            <a:gs pos="100000">
-              <a:schemeClr val="phClr">
-                <a:shade val="20000"/>
-                <a:satMod val="255000"/>
-              </a:schemeClr>
-            </a:gs>
-          </a:gsLst>
-          <a:path path="circle">
-            <a:fillToRect l="50000" t="-80000" r="50000" b="180000"/>
-          </a:path>
-        </a:gradFill>
-        <a:gradFill rotWithShape="1">
-          <a:gsLst>
-            <a:gs pos="0">
-              <a:schemeClr val="phClr">
-                <a:tint val="80000"/>
-                <a:satMod val="300000"/>
-              </a:schemeClr>
-            </a:gs>
-            <a:gs pos="100000">
-              <a:schemeClr val="phClr">
-                <a:shade val="30000"/>
-                <a:satMod val="200000"/>
-              </a:schemeClr>
-            </a:gs>
-          </a:gsLst>
-          <a:path path="circle">
-            <a:fillToRect l="50000" t="50000" r="50000" b="50000"/>
-          </a:path>
-        </a:gradFill>
-      </a:bgFillStyleLst>
-    </a:fmtScheme>
-  </a:themeElements>
-</a:theme>
 </file>
</xml_diff>